<commit_message>
this is the final touchup in the functionality part, 1->will show error on the booking page itsrlf. 2->some desine tweak,
</commit_message>
<xml_diff>
--- a/WE TRAVEL.pptx
+++ b/WE TRAVEL.pptx
@@ -3427,7 +3427,7 @@
         <a:p>
           <a:r>
             <a:rPr lang="en-US" dirty="0"/>
-            <a:t>Localhost:78</a:t>
+            <a:t>Localhost:2022</a:t>
           </a:r>
         </a:p>
       </dgm:t>
@@ -5687,7 +5687,7 @@
           </a:pPr>
           <a:r>
             <a:rPr lang="en-US" sz="2600" kern="1200" dirty="0"/>
-            <a:t>Localhost:78</a:t>
+            <a:t>Localhost:2022</a:t>
           </a:r>
         </a:p>
       </dsp:txBody>
@@ -13992,7 +13992,7 @@
           <a:p>
             <a:fld id="{88B24071-69B2-40A7-B3EA-674584CE017F}" type="datetimeFigureOut">
               <a:rPr lang="en-US" smtClean="0"/>
-              <a:t>10/8/2022</a:t>
+              <a:t>10/19/2022</a:t>
             </a:fld>
             <a:endParaRPr lang="en-US" dirty="0"/>
           </a:p>
@@ -14169,7 +14169,7 @@
           <a:p>
             <a:fld id="{1D16B909-20DD-493C-AC6E-6A09AF3AE40E}" type="datetimeFigureOut">
               <a:rPr lang="en-US" smtClean="0"/>
-              <a:t>10/8/2022</a:t>
+              <a:t>10/19/2022</a:t>
             </a:fld>
             <a:endParaRPr lang="en-US" dirty="0"/>
           </a:p>
@@ -15585,7 +15585,7 @@
             <a:fld id="{B61BEF0D-F0BB-DE4B-95CE-6DB70DBA9567}" type="datetimeFigureOut">
               <a:rPr lang="en-US" smtClean="0"/>
               <a:pPr/>
-              <a:t>10/8/2022</a:t>
+              <a:t>10/19/2022</a:t>
             </a:fld>
             <a:endParaRPr lang="en-US" dirty="0"/>
           </a:p>
@@ -15911,7 +15911,7 @@
             <a:fld id="{B61BEF0D-F0BB-DE4B-95CE-6DB70DBA9567}" type="datetimeFigureOut">
               <a:rPr lang="en-US" smtClean="0"/>
               <a:pPr/>
-              <a:t>10/8/2022</a:t>
+              <a:t>10/19/2022</a:t>
             </a:fld>
             <a:endParaRPr lang="en-US" dirty="0"/>
           </a:p>
@@ -16161,7 +16161,7 @@
             <a:fld id="{B61BEF0D-F0BB-DE4B-95CE-6DB70DBA9567}" type="datetimeFigureOut">
               <a:rPr lang="en-US" smtClean="0"/>
               <a:pPr/>
-              <a:t>10/8/2022</a:t>
+              <a:t>10/19/2022</a:t>
             </a:fld>
             <a:endParaRPr lang="en-US" dirty="0"/>
           </a:p>
@@ -16502,7 +16502,7 @@
             <a:fld id="{B61BEF0D-F0BB-DE4B-95CE-6DB70DBA9567}" type="datetimeFigureOut">
               <a:rPr lang="en-US" smtClean="0"/>
               <a:pPr/>
-              <a:t>10/8/2022</a:t>
+              <a:t>10/19/2022</a:t>
             </a:fld>
             <a:endParaRPr lang="en-US" dirty="0"/>
           </a:p>
@@ -16851,7 +16851,7 @@
             <a:fld id="{B61BEF0D-F0BB-DE4B-95CE-6DB70DBA9567}" type="datetimeFigureOut">
               <a:rPr lang="en-US" smtClean="0"/>
               <a:pPr/>
-              <a:t>10/8/2022</a:t>
+              <a:t>10/19/2022</a:t>
             </a:fld>
             <a:endParaRPr lang="en-US" dirty="0"/>
           </a:p>
@@ -17227,7 +17227,7 @@
             <a:fld id="{B61BEF0D-F0BB-DE4B-95CE-6DB70DBA9567}" type="datetimeFigureOut">
               <a:rPr lang="en-US" smtClean="0"/>
               <a:pPr/>
-              <a:t>10/8/2022</a:t>
+              <a:t>10/19/2022</a:t>
             </a:fld>
             <a:endParaRPr lang="en-US" dirty="0"/>
           </a:p>
@@ -17699,7 +17699,7 @@
             <a:fld id="{B61BEF0D-F0BB-DE4B-95CE-6DB70DBA9567}" type="datetimeFigureOut">
               <a:rPr lang="en-US" smtClean="0"/>
               <a:pPr/>
-              <a:t>10/8/2022</a:t>
+              <a:t>10/19/2022</a:t>
             </a:fld>
             <a:endParaRPr lang="en-US" dirty="0"/>
           </a:p>
@@ -17906,7 +17906,7 @@
             <a:fld id="{B61BEF0D-F0BB-DE4B-95CE-6DB70DBA9567}" type="datetimeFigureOut">
               <a:rPr lang="en-US" smtClean="0"/>
               <a:pPr/>
-              <a:t>10/8/2022</a:t>
+              <a:t>10/19/2022</a:t>
             </a:fld>
             <a:endParaRPr lang="en-US" dirty="0"/>
           </a:p>
@@ -18119,7 +18119,7 @@
             <a:fld id="{B61BEF0D-F0BB-DE4B-95CE-6DB70DBA9567}" type="datetimeFigureOut">
               <a:rPr lang="en-US" smtClean="0"/>
               <a:pPr/>
-              <a:t>10/8/2022</a:t>
+              <a:t>10/19/2022</a:t>
             </a:fld>
             <a:endParaRPr lang="en-US" dirty="0"/>
           </a:p>
@@ -18351,7 +18351,7 @@
           <a:p>
             <a:fld id="{05BFA754-D5C3-4E66-96A6-867B257F58DC}" type="datetimeFigureOut">
               <a:rPr lang="en-US" smtClean="0"/>
-              <a:t>10/8/2022</a:t>
+              <a:t>10/19/2022</a:t>
             </a:fld>
             <a:endParaRPr lang="en-US" dirty="0"/>
           </a:p>
@@ -18600,7 +18600,7 @@
             <a:fld id="{B61BEF0D-F0BB-DE4B-95CE-6DB70DBA9567}" type="datetimeFigureOut">
               <a:rPr lang="en-US" smtClean="0"/>
               <a:pPr/>
-              <a:t>10/8/2022</a:t>
+              <a:t>10/19/2022</a:t>
             </a:fld>
             <a:endParaRPr lang="en-US" dirty="0"/>
           </a:p>
@@ -18899,7 +18899,7 @@
           <a:p>
             <a:fld id="{05BFA754-D5C3-4E66-96A6-867B257F58DC}" type="datetimeFigureOut">
               <a:rPr lang="en-US" smtClean="0"/>
-              <a:t>10/8/2022</a:t>
+              <a:t>10/19/2022</a:t>
             </a:fld>
             <a:endParaRPr lang="en-US" dirty="0"/>
           </a:p>
@@ -19282,7 +19282,7 @@
             <a:fld id="{B61BEF0D-F0BB-DE4B-95CE-6DB70DBA9567}" type="datetimeFigureOut">
               <a:rPr lang="en-US" smtClean="0"/>
               <a:pPr/>
-              <a:t>10/8/2022</a:t>
+              <a:t>10/19/2022</a:t>
             </a:fld>
             <a:endParaRPr lang="en-US" dirty="0"/>
           </a:p>
@@ -19433,7 +19433,7 @@
             <a:fld id="{B61BEF0D-F0BB-DE4B-95CE-6DB70DBA9567}" type="datetimeFigureOut">
               <a:rPr lang="en-US" smtClean="0"/>
               <a:pPr/>
-              <a:t>10/8/2022</a:t>
+              <a:t>10/19/2022</a:t>
             </a:fld>
             <a:endParaRPr lang="en-US" dirty="0"/>
           </a:p>
@@ -19561,7 +19561,7 @@
             <a:fld id="{B61BEF0D-F0BB-DE4B-95CE-6DB70DBA9567}" type="datetimeFigureOut">
               <a:rPr lang="en-US" smtClean="0"/>
               <a:pPr/>
-              <a:t>10/8/2022</a:t>
+              <a:t>10/19/2022</a:t>
             </a:fld>
             <a:endParaRPr lang="en-US" dirty="0"/>
           </a:p>
@@ -19818,7 +19818,7 @@
             <a:fld id="{B61BEF0D-F0BB-DE4B-95CE-6DB70DBA9567}" type="datetimeFigureOut">
               <a:rPr lang="en-US" smtClean="0"/>
               <a:pPr/>
-              <a:t>10/8/2022</a:t>
+              <a:t>10/19/2022</a:t>
             </a:fld>
             <a:endParaRPr lang="en-US" dirty="0"/>
           </a:p>
@@ -20135,7 +20135,7 @@
             <a:fld id="{B61BEF0D-F0BB-DE4B-95CE-6DB70DBA9567}" type="datetimeFigureOut">
               <a:rPr lang="en-US" smtClean="0"/>
               <a:pPr/>
-              <a:t>10/8/2022</a:t>
+              <a:t>10/19/2022</a:t>
             </a:fld>
             <a:endParaRPr lang="en-US" dirty="0"/>
           </a:p>
@@ -20381,7 +20381,7 @@
             <a:fld id="{B61BEF0D-F0BB-DE4B-95CE-6DB70DBA9567}" type="datetimeFigureOut">
               <a:rPr lang="en-US" smtClean="0"/>
               <a:pPr/>
-              <a:t>10/8/2022</a:t>
+              <a:t>10/19/2022</a:t>
             </a:fld>
             <a:endParaRPr lang="en-US" dirty="0"/>
           </a:p>
@@ -22618,7 +22618,7 @@
             <p:ph idx="1"/>
             <p:extLst>
               <p:ext uri="{D42A27DB-BD31-4B8C-83A1-F6EECF244321}">
-                <p14:modId xmlns:p14="http://schemas.microsoft.com/office/powerpoint/2010/main" val="2294496563"/>
+                <p14:modId xmlns:p14="http://schemas.microsoft.com/office/powerpoint/2010/main" val="726010352"/>
               </p:ext>
             </p:extLst>
           </p:nvPr>
@@ -24537,18 +24537,25 @@
         </p:nvSpPr>
         <p:spPr/>
         <p:txBody>
-          <a:bodyPr/>
+          <a:bodyPr>
+            <a:normAutofit/>
+          </a:bodyPr>
           <a:lstStyle/>
           <a:p>
             <a:r>
-              <a:rPr lang="en-IN" sz="3200" dirty="0"/>
-              <a:t>This web app lets you know the places to explore while you are planning your vacation.</a:t>
+              <a:rPr lang="en-IN" sz="3200" dirty="0">
+                <a:effectLst/>
+                <a:ea typeface="Calibri" panose="020F0502020204030204" pitchFamily="34" charset="0"/>
+                <a:cs typeface="Times New Roman" panose="02020603050405020304" pitchFamily="18" charset="0"/>
+              </a:rPr>
+              <a:t>The design of this We Travel Express website considers the Indian culture's joint family system.</a:t>
             </a:r>
+            <a:endParaRPr lang="en-IN" sz="3200" dirty="0"/>
           </a:p>
           <a:p>
             <a:r>
               <a:rPr lang="en-IN" sz="3200" dirty="0"/>
-              <a:t>You will know India well.</a:t>
+              <a:t>This web app lets you explore and plan your vacation.</a:t>
             </a:r>
           </a:p>
           <a:p>
@@ -24560,7 +24567,7 @@
           <a:p>
             <a:r>
               <a:rPr lang="en-IN" sz="3200" dirty="0"/>
-              <a:t>JS and Nodejs are used to build this app.</a:t>
+              <a:t>HTML, CSS, JS, and Nodejs are used to build this app.</a:t>
             </a:r>
           </a:p>
           <a:p>
@@ -26537,15 +26544,6 @@
 </file>
 
 <file path=customXml/item1.xml><?xml version="1.0" encoding="utf-8"?>
-<p:properties xmlns:p="http://schemas.microsoft.com/office/2006/metadata/properties" xmlns:xsi="http://www.w3.org/2001/XMLSchema-instance" xmlns:pc="http://schemas.microsoft.com/office/infopath/2007/PartnerControls">
-  <documentManagement>
-    <Status xmlns="71af3243-3dd4-4a8d-8c0d-dd76da1f02a5">Not started</Status>
-    <MediaServiceKeyPoints xmlns="71af3243-3dd4-4a8d-8c0d-dd76da1f02a5" xsi:nil="true"/>
-  </documentManagement>
-</p:properties>
-</file>
-
-<file path=customXml/item2.xml><?xml version="1.0" encoding="utf-8"?>
 <ct:contentTypeSchema xmlns:ct="http://schemas.microsoft.com/office/2006/metadata/contentType" xmlns:ma="http://schemas.microsoft.com/office/2006/metadata/properties/metaAttributes" ct:_="" ma:_="" ma:contentTypeName="Document" ma:contentTypeID="0x01010079F111ED35F8CC479449609E8A0923A6" ma:contentTypeVersion="12" ma:contentTypeDescription="Create a new document." ma:contentTypeScope="" ma:versionID="93813dd7ca6ad654711aa0ab317e03a3">
   <xsd:schema xmlns:xsd="http://www.w3.org/2001/XMLSchema" xmlns:xs="http://www.w3.org/2001/XMLSchema" xmlns:p="http://schemas.microsoft.com/office/2006/metadata/properties" xmlns:ns2="71af3243-3dd4-4a8d-8c0d-dd76da1f02a5" xmlns:ns3="16c05727-aa75-4e4a-9b5f-8a80a1165891" targetNamespace="http://schemas.microsoft.com/office/2006/metadata/properties" ma:root="true" ma:fieldsID="f11dc0ce689dd3925e84e4e35398c6e7" ns2:_="" ns3:_="">
     <xsd:import namespace="71af3243-3dd4-4a8d-8c0d-dd76da1f02a5"/>
@@ -26766,6 +26764,15 @@
 </ct:contentTypeSchema>
 </file>
 
+<file path=customXml/item2.xml><?xml version="1.0" encoding="utf-8"?>
+<p:properties xmlns:p="http://schemas.microsoft.com/office/2006/metadata/properties" xmlns:xsi="http://www.w3.org/2001/XMLSchema-instance" xmlns:pc="http://schemas.microsoft.com/office/infopath/2007/PartnerControls">
+  <documentManagement>
+    <Status xmlns="71af3243-3dd4-4a8d-8c0d-dd76da1f02a5">Not started</Status>
+    <MediaServiceKeyPoints xmlns="71af3243-3dd4-4a8d-8c0d-dd76da1f02a5" xsi:nil="true"/>
+  </documentManagement>
+</p:properties>
+</file>
+
 <file path=customXml/item3.xml><?xml version="1.0" encoding="utf-8"?>
 <?mso-contentType ?>
 <FormTemplates xmlns="http://schemas.microsoft.com/sharepoint/v3/contenttype/forms">
@@ -26776,16 +26783,6 @@
 </file>
 
 <file path=customXml/itemProps1.xml><?xml version="1.0" encoding="utf-8"?>
-<ds:datastoreItem xmlns:ds="http://schemas.openxmlformats.org/officeDocument/2006/customXml" ds:itemID="{E0C6F0FA-5858-4AD1-8F89-D32310719A51}">
-  <ds:schemaRefs>
-    <ds:schemaRef ds:uri="http://schemas.microsoft.com/office/2006/metadata/properties"/>
-    <ds:schemaRef ds:uri="http://schemas.microsoft.com/office/infopath/2007/PartnerControls"/>
-    <ds:schemaRef ds:uri="71af3243-3dd4-4a8d-8c0d-dd76da1f02a5"/>
-  </ds:schemaRefs>
-</ds:datastoreItem>
-</file>
-
-<file path=customXml/itemProps2.xml><?xml version="1.0" encoding="utf-8"?>
 <ds:datastoreItem xmlns:ds="http://schemas.openxmlformats.org/officeDocument/2006/customXml" ds:itemID="{0F92F16A-38EE-4C9D-AFD3-2845EC2D9067}">
   <ds:schemaRefs>
     <ds:schemaRef ds:uri="http://schemas.microsoft.com/office/2006/metadata/contentType"/>
@@ -26804,6 +26801,16 @@
 </ds:datastoreItem>
 </file>
 
+<file path=customXml/itemProps2.xml><?xml version="1.0" encoding="utf-8"?>
+<ds:datastoreItem xmlns:ds="http://schemas.openxmlformats.org/officeDocument/2006/customXml" ds:itemID="{E0C6F0FA-5858-4AD1-8F89-D32310719A51}">
+  <ds:schemaRefs>
+    <ds:schemaRef ds:uri="http://schemas.microsoft.com/office/2006/metadata/properties"/>
+    <ds:schemaRef ds:uri="http://schemas.microsoft.com/office/infopath/2007/PartnerControls"/>
+    <ds:schemaRef ds:uri="71af3243-3dd4-4a8d-8c0d-dd76da1f02a5"/>
+  </ds:schemaRefs>
+</ds:datastoreItem>
+</file>
+
 <file path=customXml/itemProps3.xml><?xml version="1.0" encoding="utf-8"?>
 <ds:datastoreItem xmlns:ds="http://schemas.openxmlformats.org/officeDocument/2006/customXml" ds:itemID="{075A39CB-C45B-4F08-829C-AB9550EE08FE}">
   <ds:schemaRefs>

</xml_diff>

<commit_message>
added alert module in server.js,edited ppt and added final report
</commit_message>
<xml_diff>
--- a/WE TRAVEL.pptx
+++ b/WE TRAVEL.pptx
@@ -5,25 +5,26 @@
     <p:sldMasterId id="2147483688" r:id="rId4"/>
   </p:sldMasterIdLst>
   <p:notesMasterIdLst>
-    <p:notesMasterId r:id="rId18"/>
+    <p:notesMasterId r:id="rId19"/>
   </p:notesMasterIdLst>
   <p:handoutMasterIdLst>
-    <p:handoutMasterId r:id="rId19"/>
+    <p:handoutMasterId r:id="rId20"/>
   </p:handoutMasterIdLst>
   <p:sldIdLst>
     <p:sldId id="256" r:id="rId5"/>
-    <p:sldId id="262" r:id="rId6"/>
-    <p:sldId id="275" r:id="rId7"/>
+    <p:sldId id="275" r:id="rId6"/>
+    <p:sldId id="262" r:id="rId7"/>
     <p:sldId id="266" r:id="rId8"/>
     <p:sldId id="261" r:id="rId9"/>
-    <p:sldId id="268" r:id="rId10"/>
-    <p:sldId id="267" r:id="rId11"/>
-    <p:sldId id="270" r:id="rId12"/>
-    <p:sldId id="271" r:id="rId13"/>
-    <p:sldId id="272" r:id="rId14"/>
-    <p:sldId id="259" r:id="rId15"/>
-    <p:sldId id="274" r:id="rId16"/>
-    <p:sldId id="265" r:id="rId17"/>
+    <p:sldId id="276" r:id="rId10"/>
+    <p:sldId id="268" r:id="rId11"/>
+    <p:sldId id="267" r:id="rId12"/>
+    <p:sldId id="270" r:id="rId13"/>
+    <p:sldId id="271" r:id="rId14"/>
+    <p:sldId id="272" r:id="rId15"/>
+    <p:sldId id="259" r:id="rId16"/>
+    <p:sldId id="274" r:id="rId17"/>
+    <p:sldId id="265" r:id="rId18"/>
   </p:sldIdLst>
   <p:sldSz cx="12192000" cy="6858000"/>
   <p:notesSz cx="6858000" cy="9144000"/>
@@ -13992,7 +13993,7 @@
           <a:p>
             <a:fld id="{88B24071-69B2-40A7-B3EA-674584CE017F}" type="datetimeFigureOut">
               <a:rPr lang="en-US" smtClean="0"/>
-              <a:t>10/19/2022</a:t>
+              <a:t>10/20/2022</a:t>
             </a:fld>
             <a:endParaRPr lang="en-US" dirty="0"/>
           </a:p>
@@ -14169,7 +14170,7 @@
           <a:p>
             <a:fld id="{1D16B909-20DD-493C-AC6E-6A09AF3AE40E}" type="datetimeFigureOut">
               <a:rPr lang="en-US" smtClean="0"/>
-              <a:t>10/19/2022</a:t>
+              <a:t>10/20/2022</a:t>
             </a:fld>
             <a:endParaRPr lang="en-US" dirty="0"/>
           </a:p>
@@ -14594,7 +14595,7 @@
     </p:spTree>
     <p:extLst>
       <p:ext uri="{BB962C8B-B14F-4D97-AF65-F5344CB8AC3E}">
-        <p14:creationId xmlns:p14="http://schemas.microsoft.com/office/powerpoint/2010/main" val="4083713905"/>
+        <p14:creationId xmlns:p14="http://schemas.microsoft.com/office/powerpoint/2010/main" val="1014233924"/>
       </p:ext>
     </p:extLst>
   </p:cSld>
@@ -14678,6 +14679,90 @@
     </p:spTree>
     <p:extLst>
       <p:ext uri="{BB962C8B-B14F-4D97-AF65-F5344CB8AC3E}">
+        <p14:creationId xmlns:p14="http://schemas.microsoft.com/office/powerpoint/2010/main" val="4083713905"/>
+      </p:ext>
+    </p:extLst>
+  </p:cSld>
+  <p:clrMapOvr>
+    <a:masterClrMapping/>
+  </p:clrMapOvr>
+</p:notes>
+</file>
+
+<file path=ppt/notesSlides/notesSlide12.xml><?xml version="1.0" encoding="utf-8"?>
+<p:notes xmlns:a="http://schemas.openxmlformats.org/drawingml/2006/main" xmlns:r="http://schemas.openxmlformats.org/officeDocument/2006/relationships" xmlns:p="http://schemas.openxmlformats.org/presentationml/2006/main">
+  <p:cSld>
+    <p:spTree>
+      <p:nvGrpSpPr>
+        <p:cNvPr id="1" name=""/>
+        <p:cNvGrpSpPr/>
+        <p:nvPr/>
+      </p:nvGrpSpPr>
+      <p:grpSpPr>
+        <a:xfrm>
+          <a:off x="0" y="0"/>
+          <a:ext cx="0" cy="0"/>
+          <a:chOff x="0" y="0"/>
+          <a:chExt cx="0" cy="0"/>
+        </a:xfrm>
+      </p:grpSpPr>
+      <p:sp>
+        <p:nvSpPr>
+          <p:cNvPr id="2" name="Slide Image Placeholder 1"/>
+          <p:cNvSpPr>
+            <a:spLocks noGrp="1" noRot="1" noChangeAspect="1"/>
+          </p:cNvSpPr>
+          <p:nvPr>
+            <p:ph type="sldImg"/>
+          </p:nvPr>
+        </p:nvSpPr>
+        <p:spPr/>
+      </p:sp>
+      <p:sp>
+        <p:nvSpPr>
+          <p:cNvPr id="3" name="Notes Placeholder 2"/>
+          <p:cNvSpPr>
+            <a:spLocks noGrp="1"/>
+          </p:cNvSpPr>
+          <p:nvPr>
+            <p:ph type="body" idx="1"/>
+          </p:nvPr>
+        </p:nvSpPr>
+        <p:spPr/>
+        <p:txBody>
+          <a:bodyPr/>
+          <a:lstStyle/>
+          <a:p>
+            <a:endParaRPr lang="en-US" dirty="0"/>
+          </a:p>
+        </p:txBody>
+      </p:sp>
+      <p:sp>
+        <p:nvSpPr>
+          <p:cNvPr id="4" name="Slide Number Placeholder 3"/>
+          <p:cNvSpPr>
+            <a:spLocks noGrp="1"/>
+          </p:cNvSpPr>
+          <p:nvPr>
+            <p:ph type="sldNum" sz="quarter" idx="5"/>
+          </p:nvPr>
+        </p:nvSpPr>
+        <p:spPr/>
+        <p:txBody>
+          <a:bodyPr/>
+          <a:lstStyle/>
+          <a:p>
+            <a:fld id="{F6BA3186-490C-4963-9CE5-58096C2F0BE5}" type="slidenum">
+              <a:rPr lang="en-US" smtClean="0"/>
+              <a:t>14</a:t>
+            </a:fld>
+            <a:endParaRPr lang="en-US" dirty="0"/>
+          </a:p>
+        </p:txBody>
+      </p:sp>
+    </p:spTree>
+    <p:extLst>
+      <p:ext uri="{BB962C8B-B14F-4D97-AF65-F5344CB8AC3E}">
         <p14:creationId xmlns:p14="http://schemas.microsoft.com/office/powerpoint/2010/main" val="2716772995"/>
       </p:ext>
     </p:extLst>
@@ -14753,7 +14838,7 @@
           <a:p>
             <a:fld id="{F6BA3186-490C-4963-9CE5-58096C2F0BE5}" type="slidenum">
               <a:rPr lang="en-US" smtClean="0"/>
-              <a:t>2</a:t>
+              <a:t>3</a:t>
             </a:fld>
             <a:endParaRPr lang="en-US" dirty="0"/>
           </a:p>
@@ -14930,7 +15015,7 @@
     </p:spTree>
     <p:extLst>
       <p:ext uri="{BB962C8B-B14F-4D97-AF65-F5344CB8AC3E}">
-        <p14:creationId xmlns:p14="http://schemas.microsoft.com/office/powerpoint/2010/main" val="1166345162"/>
+        <p14:creationId xmlns:p14="http://schemas.microsoft.com/office/powerpoint/2010/main" val="4172207247"/>
       </p:ext>
     </p:extLst>
   </p:cSld>
@@ -15014,7 +15099,7 @@
     </p:spTree>
     <p:extLst>
       <p:ext uri="{BB962C8B-B14F-4D97-AF65-F5344CB8AC3E}">
-        <p14:creationId xmlns:p14="http://schemas.microsoft.com/office/powerpoint/2010/main" val="3182173798"/>
+        <p14:creationId xmlns:p14="http://schemas.microsoft.com/office/powerpoint/2010/main" val="1166345162"/>
       </p:ext>
     </p:extLst>
   </p:cSld>
@@ -15098,7 +15183,7 @@
     </p:spTree>
     <p:extLst>
       <p:ext uri="{BB962C8B-B14F-4D97-AF65-F5344CB8AC3E}">
-        <p14:creationId xmlns:p14="http://schemas.microsoft.com/office/powerpoint/2010/main" val="889004473"/>
+        <p14:creationId xmlns:p14="http://schemas.microsoft.com/office/powerpoint/2010/main" val="3182173798"/>
       </p:ext>
     </p:extLst>
   </p:cSld>
@@ -15182,7 +15267,7 @@
     </p:spTree>
     <p:extLst>
       <p:ext uri="{BB962C8B-B14F-4D97-AF65-F5344CB8AC3E}">
-        <p14:creationId xmlns:p14="http://schemas.microsoft.com/office/powerpoint/2010/main" val="3792048389"/>
+        <p14:creationId xmlns:p14="http://schemas.microsoft.com/office/powerpoint/2010/main" val="889004473"/>
       </p:ext>
     </p:extLst>
   </p:cSld>
@@ -15266,7 +15351,7 @@
     </p:spTree>
     <p:extLst>
       <p:ext uri="{BB962C8B-B14F-4D97-AF65-F5344CB8AC3E}">
-        <p14:creationId xmlns:p14="http://schemas.microsoft.com/office/powerpoint/2010/main" val="1619334364"/>
+        <p14:creationId xmlns:p14="http://schemas.microsoft.com/office/powerpoint/2010/main" val="3792048389"/>
       </p:ext>
     </p:extLst>
   </p:cSld>
@@ -15350,7 +15435,7 @@
     </p:spTree>
     <p:extLst>
       <p:ext uri="{BB962C8B-B14F-4D97-AF65-F5344CB8AC3E}">
-        <p14:creationId xmlns:p14="http://schemas.microsoft.com/office/powerpoint/2010/main" val="1014233924"/>
+        <p14:creationId xmlns:p14="http://schemas.microsoft.com/office/powerpoint/2010/main" val="1619334364"/>
       </p:ext>
     </p:extLst>
   </p:cSld>
@@ -15585,7 +15670,7 @@
             <a:fld id="{B61BEF0D-F0BB-DE4B-95CE-6DB70DBA9567}" type="datetimeFigureOut">
               <a:rPr lang="en-US" smtClean="0"/>
               <a:pPr/>
-              <a:t>10/19/2022</a:t>
+              <a:t>10/20/2022</a:t>
             </a:fld>
             <a:endParaRPr lang="en-US" dirty="0"/>
           </a:p>
@@ -15911,7 +15996,7 @@
             <a:fld id="{B61BEF0D-F0BB-DE4B-95CE-6DB70DBA9567}" type="datetimeFigureOut">
               <a:rPr lang="en-US" smtClean="0"/>
               <a:pPr/>
-              <a:t>10/19/2022</a:t>
+              <a:t>10/20/2022</a:t>
             </a:fld>
             <a:endParaRPr lang="en-US" dirty="0"/>
           </a:p>
@@ -16161,7 +16246,7 @@
             <a:fld id="{B61BEF0D-F0BB-DE4B-95CE-6DB70DBA9567}" type="datetimeFigureOut">
               <a:rPr lang="en-US" smtClean="0"/>
               <a:pPr/>
-              <a:t>10/19/2022</a:t>
+              <a:t>10/20/2022</a:t>
             </a:fld>
             <a:endParaRPr lang="en-US" dirty="0"/>
           </a:p>
@@ -16502,7 +16587,7 @@
             <a:fld id="{B61BEF0D-F0BB-DE4B-95CE-6DB70DBA9567}" type="datetimeFigureOut">
               <a:rPr lang="en-US" smtClean="0"/>
               <a:pPr/>
-              <a:t>10/19/2022</a:t>
+              <a:t>10/20/2022</a:t>
             </a:fld>
             <a:endParaRPr lang="en-US" dirty="0"/>
           </a:p>
@@ -16851,7 +16936,7 @@
             <a:fld id="{B61BEF0D-F0BB-DE4B-95CE-6DB70DBA9567}" type="datetimeFigureOut">
               <a:rPr lang="en-US" smtClean="0"/>
               <a:pPr/>
-              <a:t>10/19/2022</a:t>
+              <a:t>10/20/2022</a:t>
             </a:fld>
             <a:endParaRPr lang="en-US" dirty="0"/>
           </a:p>
@@ -17227,7 +17312,7 @@
             <a:fld id="{B61BEF0D-F0BB-DE4B-95CE-6DB70DBA9567}" type="datetimeFigureOut">
               <a:rPr lang="en-US" smtClean="0"/>
               <a:pPr/>
-              <a:t>10/19/2022</a:t>
+              <a:t>10/20/2022</a:t>
             </a:fld>
             <a:endParaRPr lang="en-US" dirty="0"/>
           </a:p>
@@ -17699,7 +17784,7 @@
             <a:fld id="{B61BEF0D-F0BB-DE4B-95CE-6DB70DBA9567}" type="datetimeFigureOut">
               <a:rPr lang="en-US" smtClean="0"/>
               <a:pPr/>
-              <a:t>10/19/2022</a:t>
+              <a:t>10/20/2022</a:t>
             </a:fld>
             <a:endParaRPr lang="en-US" dirty="0"/>
           </a:p>
@@ -17906,7 +17991,7 @@
             <a:fld id="{B61BEF0D-F0BB-DE4B-95CE-6DB70DBA9567}" type="datetimeFigureOut">
               <a:rPr lang="en-US" smtClean="0"/>
               <a:pPr/>
-              <a:t>10/19/2022</a:t>
+              <a:t>10/20/2022</a:t>
             </a:fld>
             <a:endParaRPr lang="en-US" dirty="0"/>
           </a:p>
@@ -18119,7 +18204,7 @@
             <a:fld id="{B61BEF0D-F0BB-DE4B-95CE-6DB70DBA9567}" type="datetimeFigureOut">
               <a:rPr lang="en-US" smtClean="0"/>
               <a:pPr/>
-              <a:t>10/19/2022</a:t>
+              <a:t>10/20/2022</a:t>
             </a:fld>
             <a:endParaRPr lang="en-US" dirty="0"/>
           </a:p>
@@ -18351,7 +18436,7 @@
           <a:p>
             <a:fld id="{05BFA754-D5C3-4E66-96A6-867B257F58DC}" type="datetimeFigureOut">
               <a:rPr lang="en-US" smtClean="0"/>
-              <a:t>10/19/2022</a:t>
+              <a:t>10/20/2022</a:t>
             </a:fld>
             <a:endParaRPr lang="en-US" dirty="0"/>
           </a:p>
@@ -18600,7 +18685,7 @@
             <a:fld id="{B61BEF0D-F0BB-DE4B-95CE-6DB70DBA9567}" type="datetimeFigureOut">
               <a:rPr lang="en-US" smtClean="0"/>
               <a:pPr/>
-              <a:t>10/19/2022</a:t>
+              <a:t>10/20/2022</a:t>
             </a:fld>
             <a:endParaRPr lang="en-US" dirty="0"/>
           </a:p>
@@ -18899,7 +18984,7 @@
           <a:p>
             <a:fld id="{05BFA754-D5C3-4E66-96A6-867B257F58DC}" type="datetimeFigureOut">
               <a:rPr lang="en-US" smtClean="0"/>
-              <a:t>10/19/2022</a:t>
+              <a:t>10/20/2022</a:t>
             </a:fld>
             <a:endParaRPr lang="en-US" dirty="0"/>
           </a:p>
@@ -19282,7 +19367,7 @@
             <a:fld id="{B61BEF0D-F0BB-DE4B-95CE-6DB70DBA9567}" type="datetimeFigureOut">
               <a:rPr lang="en-US" smtClean="0"/>
               <a:pPr/>
-              <a:t>10/19/2022</a:t>
+              <a:t>10/20/2022</a:t>
             </a:fld>
             <a:endParaRPr lang="en-US" dirty="0"/>
           </a:p>
@@ -19433,7 +19518,7 @@
             <a:fld id="{B61BEF0D-F0BB-DE4B-95CE-6DB70DBA9567}" type="datetimeFigureOut">
               <a:rPr lang="en-US" smtClean="0"/>
               <a:pPr/>
-              <a:t>10/19/2022</a:t>
+              <a:t>10/20/2022</a:t>
             </a:fld>
             <a:endParaRPr lang="en-US" dirty="0"/>
           </a:p>
@@ -19561,7 +19646,7 @@
             <a:fld id="{B61BEF0D-F0BB-DE4B-95CE-6DB70DBA9567}" type="datetimeFigureOut">
               <a:rPr lang="en-US" smtClean="0"/>
               <a:pPr/>
-              <a:t>10/19/2022</a:t>
+              <a:t>10/20/2022</a:t>
             </a:fld>
             <a:endParaRPr lang="en-US" dirty="0"/>
           </a:p>
@@ -19818,7 +19903,7 @@
             <a:fld id="{B61BEF0D-F0BB-DE4B-95CE-6DB70DBA9567}" type="datetimeFigureOut">
               <a:rPr lang="en-US" smtClean="0"/>
               <a:pPr/>
-              <a:t>10/19/2022</a:t>
+              <a:t>10/20/2022</a:t>
             </a:fld>
             <a:endParaRPr lang="en-US" dirty="0"/>
           </a:p>
@@ -20135,7 +20220,7 @@
             <a:fld id="{B61BEF0D-F0BB-DE4B-95CE-6DB70DBA9567}" type="datetimeFigureOut">
               <a:rPr lang="en-US" smtClean="0"/>
               <a:pPr/>
-              <a:t>10/19/2022</a:t>
+              <a:t>10/20/2022</a:t>
             </a:fld>
             <a:endParaRPr lang="en-US" dirty="0"/>
           </a:p>
@@ -20381,7 +20466,7 @@
             <a:fld id="{B61BEF0D-F0BB-DE4B-95CE-6DB70DBA9567}" type="datetimeFigureOut">
               <a:rPr lang="en-US" smtClean="0"/>
               <a:pPr/>
-              <a:t>10/19/2022</a:t>
+              <a:t>10/20/2022</a:t>
             </a:fld>
             <a:endParaRPr lang="en-US" dirty="0"/>
           </a:p>
@@ -22113,6 +22198,168 @@
         </p:nvSpPr>
         <p:spPr>
           <a:xfrm>
+            <a:off x="0" y="-1"/>
+            <a:ext cx="4654296" cy="6857999"/>
+          </a:xfrm>
+          <a:gradFill flip="none" rotWithShape="1">
+            <a:gsLst>
+              <a:gs pos="0">
+                <a:schemeClr val="accent6">
+                  <a:shade val="30000"/>
+                  <a:satMod val="115000"/>
+                </a:schemeClr>
+              </a:gs>
+              <a:gs pos="50000">
+                <a:schemeClr val="accent6">
+                  <a:shade val="67500"/>
+                  <a:satMod val="115000"/>
+                </a:schemeClr>
+              </a:gs>
+              <a:gs pos="100000">
+                <a:schemeClr val="accent6">
+                  <a:shade val="100000"/>
+                  <a:satMod val="115000"/>
+                </a:schemeClr>
+              </a:gs>
+            </a:gsLst>
+            <a:lin ang="2700000" scaled="1"/>
+            <a:tileRect/>
+          </a:gradFill>
+          <a:ln>
+            <a:noFill/>
+          </a:ln>
+        </p:spPr>
+        <p:txBody>
+          <a:bodyPr>
+            <a:normAutofit/>
+          </a:bodyPr>
+          <a:lstStyle/>
+          <a:p>
+            <a:r>
+              <a:rPr lang="en-US" sz="13800" b="0" dirty="0">
+                <a:solidFill>
+                  <a:schemeClr val="bg1"/>
+                </a:solidFill>
+                <a:effectLst/>
+                <a:latin typeface="Consolas" panose="020B0609020204030204" pitchFamily="49" charset="0"/>
+              </a:rPr>
+              <a:t>path</a:t>
+            </a:r>
+            <a:endParaRPr lang="en-US" dirty="0">
+              <a:solidFill>
+                <a:schemeClr val="bg1"/>
+              </a:solidFill>
+            </a:endParaRPr>
+          </a:p>
+        </p:txBody>
+      </p:sp>
+      <p:pic>
+        <p:nvPicPr>
+          <p:cNvPr id="9" name="Content Placeholder 8">
+            <a:extLst>
+              <a:ext uri="{FF2B5EF4-FFF2-40B4-BE49-F238E27FC236}">
+                <a16:creationId xmlns:a16="http://schemas.microsoft.com/office/drawing/2014/main" id="{0BAC166F-4FA7-5BCB-A123-60C1467F7D16}"/>
+              </a:ext>
+            </a:extLst>
+          </p:cNvPr>
+          <p:cNvPicPr>
+            <a:picLocks noGrp="1" noChangeAspect="1"/>
+          </p:cNvPicPr>
+          <p:nvPr>
+            <p:ph idx="1"/>
+          </p:nvPr>
+        </p:nvPicPr>
+        <p:blipFill>
+          <a:blip r:embed="rId3"/>
+          <a:stretch>
+            <a:fillRect/>
+          </a:stretch>
+        </p:blipFill>
+        <p:spPr>
+          <a:xfrm>
+            <a:off x="4796183" y="703019"/>
+            <a:ext cx="6468490" cy="1561209"/>
+          </a:xfrm>
+        </p:spPr>
+      </p:pic>
+      <p:pic>
+        <p:nvPicPr>
+          <p:cNvPr id="4" name="Picture 3">
+            <a:extLst>
+              <a:ext uri="{FF2B5EF4-FFF2-40B4-BE49-F238E27FC236}">
+                <a16:creationId xmlns:a16="http://schemas.microsoft.com/office/drawing/2014/main" id="{CBD3BE9D-F04B-9937-B84B-485137B7EC54}"/>
+              </a:ext>
+            </a:extLst>
+          </p:cNvPr>
+          <p:cNvPicPr>
+            <a:picLocks noChangeAspect="1"/>
+          </p:cNvPicPr>
+          <p:nvPr/>
+        </p:nvPicPr>
+        <p:blipFill>
+          <a:blip r:embed="rId4"/>
+          <a:stretch>
+            <a:fillRect/>
+          </a:stretch>
+        </p:blipFill>
+        <p:spPr>
+          <a:xfrm>
+            <a:off x="4811433" y="2730463"/>
+            <a:ext cx="4408572" cy="2886565"/>
+          </a:xfrm>
+          <a:prstGeom prst="rect">
+            <a:avLst/>
+          </a:prstGeom>
+        </p:spPr>
+      </p:pic>
+    </p:spTree>
+    <p:extLst>
+      <p:ext uri="{BB962C8B-B14F-4D97-AF65-F5344CB8AC3E}">
+        <p14:creationId xmlns:p14="http://schemas.microsoft.com/office/powerpoint/2010/main" val="2713327902"/>
+      </p:ext>
+    </p:extLst>
+  </p:cSld>
+  <p:clrMapOvr>
+    <a:masterClrMapping/>
+  </p:clrMapOvr>
+</p:sld>
+</file>
+
+<file path=ppt/slides/slide11.xml><?xml version="1.0" encoding="utf-8"?>
+<p:sld xmlns:a="http://schemas.openxmlformats.org/drawingml/2006/main" xmlns:r="http://schemas.openxmlformats.org/officeDocument/2006/relationships" xmlns:p="http://schemas.openxmlformats.org/presentationml/2006/main">
+  <p:cSld>
+    <p:spTree>
+      <p:nvGrpSpPr>
+        <p:cNvPr id="1" name=""/>
+        <p:cNvGrpSpPr/>
+        <p:nvPr/>
+      </p:nvGrpSpPr>
+      <p:grpSpPr>
+        <a:xfrm>
+          <a:off x="0" y="0"/>
+          <a:ext cx="0" cy="0"/>
+          <a:chOff x="0" y="0"/>
+          <a:chExt cx="0" cy="0"/>
+        </a:xfrm>
+      </p:grpSpPr>
+      <p:sp>
+        <p:nvSpPr>
+          <p:cNvPr id="2" name="Title 1">
+            <a:extLst>
+              <a:ext uri="{FF2B5EF4-FFF2-40B4-BE49-F238E27FC236}">
+                <a16:creationId xmlns:a16="http://schemas.microsoft.com/office/drawing/2014/main" id="{F6F200E9-8116-4990-B241-6223D73CDEC5}"/>
+              </a:ext>
+            </a:extLst>
+          </p:cNvPr>
+          <p:cNvSpPr>
+            <a:spLocks noGrp="1"/>
+          </p:cNvSpPr>
+          <p:nvPr>
+            <p:ph type="title"/>
+          </p:nvPr>
+        </p:nvSpPr>
+        <p:spPr>
+          <a:xfrm>
             <a:off x="0" y="1"/>
             <a:ext cx="3696353" cy="6857999"/>
           </a:xfrm>
@@ -22241,7 +22488,7 @@
 </p:sld>
 </file>
 
-<file path=ppt/slides/slide11.xml><?xml version="1.0" encoding="utf-8"?>
+<file path=ppt/slides/slide12.xml><?xml version="1.0" encoding="utf-8"?>
 <p:sld xmlns:a="http://schemas.openxmlformats.org/drawingml/2006/main" xmlns:r="http://schemas.openxmlformats.org/officeDocument/2006/relationships" xmlns:p="http://schemas.openxmlformats.org/presentationml/2006/main">
   <p:cSld>
     <p:bg>
@@ -22646,7 +22893,7 @@
 </p:sld>
 </file>
 
-<file path=ppt/slides/slide12.xml><?xml version="1.0" encoding="utf-8"?>
+<file path=ppt/slides/slide13.xml><?xml version="1.0" encoding="utf-8"?>
 <p:sld xmlns:a="http://schemas.openxmlformats.org/drawingml/2006/main" xmlns:r="http://schemas.openxmlformats.org/officeDocument/2006/relationships" xmlns:p="http://schemas.openxmlformats.org/presentationml/2006/main">
   <p:cSld>
     <p:bg>
@@ -23051,7 +23298,7 @@
 </p:sld>
 </file>
 
-<file path=ppt/slides/slide13.xml><?xml version="1.0" encoding="utf-8"?>
+<file path=ppt/slides/slide14.xml><?xml version="1.0" encoding="utf-8"?>
 <p:sld xmlns:a="http://schemas.openxmlformats.org/drawingml/2006/main" xmlns:r="http://schemas.openxmlformats.org/officeDocument/2006/relationships" xmlns:p="http://schemas.openxmlformats.org/presentationml/2006/main">
   <p:cSld>
     <p:bg>
@@ -24341,6 +24588,126 @@
 <file path=ppt/slides/slide2.xml><?xml version="1.0" encoding="utf-8"?>
 <p:sld xmlns:a="http://schemas.openxmlformats.org/drawingml/2006/main" xmlns:r="http://schemas.openxmlformats.org/officeDocument/2006/relationships" xmlns:p="http://schemas.openxmlformats.org/presentationml/2006/main">
   <p:cSld>
+    <p:spTree>
+      <p:nvGrpSpPr>
+        <p:cNvPr id="1" name=""/>
+        <p:cNvGrpSpPr/>
+        <p:nvPr/>
+      </p:nvGrpSpPr>
+      <p:grpSpPr>
+        <a:xfrm>
+          <a:off x="0" y="0"/>
+          <a:ext cx="0" cy="0"/>
+          <a:chOff x="0" y="0"/>
+          <a:chExt cx="0" cy="0"/>
+        </a:xfrm>
+      </p:grpSpPr>
+      <p:sp>
+        <p:nvSpPr>
+          <p:cNvPr id="2" name="Title 1">
+            <a:extLst>
+              <a:ext uri="{FF2B5EF4-FFF2-40B4-BE49-F238E27FC236}">
+                <a16:creationId xmlns:a16="http://schemas.microsoft.com/office/drawing/2014/main" id="{A30A6167-B889-A7F1-9617-4E871DFA131C}"/>
+              </a:ext>
+            </a:extLst>
+          </p:cNvPr>
+          <p:cNvSpPr>
+            <a:spLocks noGrp="1"/>
+          </p:cNvSpPr>
+          <p:nvPr>
+            <p:ph type="title"/>
+          </p:nvPr>
+        </p:nvSpPr>
+        <p:spPr/>
+        <p:txBody>
+          <a:bodyPr/>
+          <a:lstStyle/>
+          <a:p>
+            <a:r>
+              <a:rPr lang="en-IN" dirty="0"/>
+              <a:t>All about the web app</a:t>
+            </a:r>
+          </a:p>
+        </p:txBody>
+      </p:sp>
+      <p:sp>
+        <p:nvSpPr>
+          <p:cNvPr id="3" name="Content Placeholder 2">
+            <a:extLst>
+              <a:ext uri="{FF2B5EF4-FFF2-40B4-BE49-F238E27FC236}">
+                <a16:creationId xmlns:a16="http://schemas.microsoft.com/office/drawing/2014/main" id="{4AFF7743-72DD-DF89-8896-F10FE348615B}"/>
+              </a:ext>
+            </a:extLst>
+          </p:cNvPr>
+          <p:cNvSpPr>
+            <a:spLocks noGrp="1"/>
+          </p:cNvSpPr>
+          <p:nvPr>
+            <p:ph idx="1"/>
+          </p:nvPr>
+        </p:nvSpPr>
+        <p:spPr/>
+        <p:txBody>
+          <a:bodyPr>
+            <a:normAutofit/>
+          </a:bodyPr>
+          <a:lstStyle/>
+          <a:p>
+            <a:r>
+              <a:rPr lang="en-IN" sz="3200" dirty="0">
+                <a:effectLst/>
+                <a:ea typeface="Calibri" panose="020F0502020204030204" pitchFamily="34" charset="0"/>
+                <a:cs typeface="Times New Roman" panose="02020603050405020304" pitchFamily="18" charset="0"/>
+              </a:rPr>
+              <a:t>The design of this We Travel Express website considers the Indian culture's joint family system.</a:t>
+            </a:r>
+            <a:endParaRPr lang="en-IN" sz="3200" dirty="0"/>
+          </a:p>
+          <a:p>
+            <a:r>
+              <a:rPr lang="en-IN" sz="3200" dirty="0"/>
+              <a:t>This web app lets you explore and plan your vacation.</a:t>
+            </a:r>
+          </a:p>
+          <a:p>
+            <a:r>
+              <a:rPr lang="en-IN" sz="3200" dirty="0"/>
+              <a:t>Book your trip with us.</a:t>
+            </a:r>
+          </a:p>
+          <a:p>
+            <a:r>
+              <a:rPr lang="en-IN" sz="3200" dirty="0"/>
+              <a:t>HTML, CSS, JS, and Nodejs are used to build this app.</a:t>
+            </a:r>
+          </a:p>
+          <a:p>
+            <a:pPr marL="0" indent="0">
+              <a:buNone/>
+            </a:pPr>
+            <a:endParaRPr lang="en-IN" dirty="0"/>
+          </a:p>
+          <a:p>
+            <a:endParaRPr lang="en-IN" dirty="0"/>
+          </a:p>
+        </p:txBody>
+      </p:sp>
+    </p:spTree>
+    <p:extLst>
+      <p:ext uri="{BB962C8B-B14F-4D97-AF65-F5344CB8AC3E}">
+        <p14:creationId xmlns:p14="http://schemas.microsoft.com/office/powerpoint/2010/main" val="468247413"/>
+      </p:ext>
+    </p:extLst>
+  </p:cSld>
+  <p:clrMapOvr>
+    <a:masterClrMapping/>
+  </p:clrMapOvr>
+</p:sld>
+</file>
+
+<file path=ppt/slides/slide3.xml><?xml version="1.0" encoding="utf-8"?>
+<p:sld xmlns:a="http://schemas.openxmlformats.org/drawingml/2006/main" xmlns:r="http://schemas.openxmlformats.org/officeDocument/2006/relationships" xmlns:p="http://schemas.openxmlformats.org/presentationml/2006/main">
+  <p:cSld>
     <p:bg>
       <p:bgPr>
         <a:blipFill>
@@ -24474,126 +24841,6 @@
 </p:sld>
 </file>
 
-<file path=ppt/slides/slide3.xml><?xml version="1.0" encoding="utf-8"?>
-<p:sld xmlns:a="http://schemas.openxmlformats.org/drawingml/2006/main" xmlns:r="http://schemas.openxmlformats.org/officeDocument/2006/relationships" xmlns:p="http://schemas.openxmlformats.org/presentationml/2006/main">
-  <p:cSld>
-    <p:spTree>
-      <p:nvGrpSpPr>
-        <p:cNvPr id="1" name=""/>
-        <p:cNvGrpSpPr/>
-        <p:nvPr/>
-      </p:nvGrpSpPr>
-      <p:grpSpPr>
-        <a:xfrm>
-          <a:off x="0" y="0"/>
-          <a:ext cx="0" cy="0"/>
-          <a:chOff x="0" y="0"/>
-          <a:chExt cx="0" cy="0"/>
-        </a:xfrm>
-      </p:grpSpPr>
-      <p:sp>
-        <p:nvSpPr>
-          <p:cNvPr id="2" name="Title 1">
-            <a:extLst>
-              <a:ext uri="{FF2B5EF4-FFF2-40B4-BE49-F238E27FC236}">
-                <a16:creationId xmlns:a16="http://schemas.microsoft.com/office/drawing/2014/main" id="{A30A6167-B889-A7F1-9617-4E871DFA131C}"/>
-              </a:ext>
-            </a:extLst>
-          </p:cNvPr>
-          <p:cNvSpPr>
-            <a:spLocks noGrp="1"/>
-          </p:cNvSpPr>
-          <p:nvPr>
-            <p:ph type="title"/>
-          </p:nvPr>
-        </p:nvSpPr>
-        <p:spPr/>
-        <p:txBody>
-          <a:bodyPr/>
-          <a:lstStyle/>
-          <a:p>
-            <a:r>
-              <a:rPr lang="en-IN" dirty="0"/>
-              <a:t>All about the web app</a:t>
-            </a:r>
-          </a:p>
-        </p:txBody>
-      </p:sp>
-      <p:sp>
-        <p:nvSpPr>
-          <p:cNvPr id="3" name="Content Placeholder 2">
-            <a:extLst>
-              <a:ext uri="{FF2B5EF4-FFF2-40B4-BE49-F238E27FC236}">
-                <a16:creationId xmlns:a16="http://schemas.microsoft.com/office/drawing/2014/main" id="{4AFF7743-72DD-DF89-8896-F10FE348615B}"/>
-              </a:ext>
-            </a:extLst>
-          </p:cNvPr>
-          <p:cNvSpPr>
-            <a:spLocks noGrp="1"/>
-          </p:cNvSpPr>
-          <p:nvPr>
-            <p:ph idx="1"/>
-          </p:nvPr>
-        </p:nvSpPr>
-        <p:spPr/>
-        <p:txBody>
-          <a:bodyPr>
-            <a:normAutofit/>
-          </a:bodyPr>
-          <a:lstStyle/>
-          <a:p>
-            <a:r>
-              <a:rPr lang="en-IN" sz="3200" dirty="0">
-                <a:effectLst/>
-                <a:ea typeface="Calibri" panose="020F0502020204030204" pitchFamily="34" charset="0"/>
-                <a:cs typeface="Times New Roman" panose="02020603050405020304" pitchFamily="18" charset="0"/>
-              </a:rPr>
-              <a:t>The design of this We Travel Express website considers the Indian culture's joint family system.</a:t>
-            </a:r>
-            <a:endParaRPr lang="en-IN" sz="3200" dirty="0"/>
-          </a:p>
-          <a:p>
-            <a:r>
-              <a:rPr lang="en-IN" sz="3200" dirty="0"/>
-              <a:t>This web app lets you explore and plan your vacation.</a:t>
-            </a:r>
-          </a:p>
-          <a:p>
-            <a:r>
-              <a:rPr lang="en-IN" sz="3200" dirty="0"/>
-              <a:t>Book your trip with us.</a:t>
-            </a:r>
-          </a:p>
-          <a:p>
-            <a:r>
-              <a:rPr lang="en-IN" sz="3200" dirty="0"/>
-              <a:t>HTML, CSS, JS, and Nodejs are used to build this app.</a:t>
-            </a:r>
-          </a:p>
-          <a:p>
-            <a:pPr marL="0" indent="0">
-              <a:buNone/>
-            </a:pPr>
-            <a:endParaRPr lang="en-IN" dirty="0"/>
-          </a:p>
-          <a:p>
-            <a:endParaRPr lang="en-IN" dirty="0"/>
-          </a:p>
-        </p:txBody>
-      </p:sp>
-    </p:spTree>
-    <p:extLst>
-      <p:ext uri="{BB962C8B-B14F-4D97-AF65-F5344CB8AC3E}">
-        <p14:creationId xmlns:p14="http://schemas.microsoft.com/office/powerpoint/2010/main" val="468247413"/>
-      </p:ext>
-    </p:extLst>
-  </p:cSld>
-  <p:clrMapOvr>
-    <a:masterClrMapping/>
-  </p:clrMapOvr>
-</p:sld>
-</file>
-
 <file path=ppt/slides/slide4.xml><?xml version="1.0" encoding="utf-8"?>
 <p:sld xmlns:a="http://schemas.openxmlformats.org/drawingml/2006/main" xmlns:r="http://schemas.openxmlformats.org/officeDocument/2006/relationships" xmlns:p="http://schemas.openxmlformats.org/presentationml/2006/main">
   <p:cSld>
@@ -24711,6 +24958,512 @@
 </file>
 
 <file path=ppt/slides/slide5.xml><?xml version="1.0" encoding="utf-8"?>
+<p:sld xmlns:a="http://schemas.openxmlformats.org/drawingml/2006/main" xmlns:r="http://schemas.openxmlformats.org/officeDocument/2006/relationships" xmlns:p="http://schemas.openxmlformats.org/presentationml/2006/main">
+  <p:cSld>
+    <p:bg>
+      <p:bgPr>
+        <a:solidFill>
+          <a:schemeClr val="bg1">
+            <a:lumMod val="85000"/>
+            <a:lumOff val="15000"/>
+          </a:schemeClr>
+        </a:solidFill>
+        <a:effectLst/>
+      </p:bgPr>
+    </p:bg>
+    <p:spTree>
+      <p:nvGrpSpPr>
+        <p:cNvPr id="1" name=""/>
+        <p:cNvGrpSpPr/>
+        <p:nvPr/>
+      </p:nvGrpSpPr>
+      <p:grpSpPr>
+        <a:xfrm>
+          <a:off x="0" y="0"/>
+          <a:ext cx="0" cy="0"/>
+          <a:chOff x="0" y="0"/>
+          <a:chExt cx="0" cy="0"/>
+        </a:xfrm>
+      </p:grpSpPr>
+      <p:sp useBgFill="1">
+        <p:nvSpPr>
+          <p:cNvPr id="8" name="Rectangle 7">
+            <a:extLst>
+              <a:ext uri="{FF2B5EF4-FFF2-40B4-BE49-F238E27FC236}">
+                <a16:creationId xmlns:a16="http://schemas.microsoft.com/office/drawing/2014/main" id="{DA954E3F-C90F-4AED-8C5E-30BBC99870ED}"/>
+              </a:ext>
+              <a:ext uri="{C183D7F6-B498-43B3-948B-1728B52AA6E4}">
+                <adec:decorative xmlns:adec="http://schemas.microsoft.com/office/drawing/2017/decorative" val="1"/>
+              </a:ext>
+            </a:extLst>
+          </p:cNvPr>
+          <p:cNvSpPr>
+            <a:spLocks noGrp="1" noRot="1" noChangeAspect="1" noMove="1" noResize="1" noEditPoints="1" noAdjustHandles="1" noChangeArrowheads="1" noChangeShapeType="1" noTextEdit="1"/>
+          </p:cNvSpPr>
+          <p:nvPr>
+            <p:extLst>
+              <p:ext uri="{386F3935-93C4-4BCD-93E2-E3B085C9AB24}">
+                <p16:designElem xmlns:p16="http://schemas.microsoft.com/office/powerpoint/2015/main" val="1"/>
+              </p:ext>
+            </p:extLst>
+          </p:nvPr>
+        </p:nvSpPr>
+        <p:spPr>
+          <a:xfrm>
+            <a:off x="0" y="0"/>
+            <a:ext cx="12192000" cy="6858000"/>
+          </a:xfrm>
+          <a:prstGeom prst="rect">
+            <a:avLst/>
+          </a:prstGeom>
+          <a:ln>
+            <a:noFill/>
+          </a:ln>
+        </p:spPr>
+        <p:style>
+          <a:lnRef idx="2">
+            <a:schemeClr val="accent1">
+              <a:shade val="50000"/>
+            </a:schemeClr>
+          </a:lnRef>
+          <a:fillRef idx="1">
+            <a:schemeClr val="accent1"/>
+          </a:fillRef>
+          <a:effectRef idx="0">
+            <a:schemeClr val="accent1"/>
+          </a:effectRef>
+          <a:fontRef idx="minor">
+            <a:schemeClr val="lt1"/>
+          </a:fontRef>
+        </p:style>
+        <p:txBody>
+          <a:bodyPr rtlCol="0" anchor="ctr"/>
+          <a:lstStyle/>
+          <a:p>
+            <a:pPr algn="ctr"/>
+            <a:endParaRPr lang="en-US" dirty="0"/>
+          </a:p>
+        </p:txBody>
+      </p:sp>
+      <p:sp>
+        <p:nvSpPr>
+          <p:cNvPr id="10" name="Rectangle 9">
+            <a:extLst>
+              <a:ext uri="{FF2B5EF4-FFF2-40B4-BE49-F238E27FC236}">
+                <a16:creationId xmlns:a16="http://schemas.microsoft.com/office/drawing/2014/main" id="{45F274D6-81B5-4350-AFD5-014504FF599C}"/>
+              </a:ext>
+              <a:ext uri="{C183D7F6-B498-43B3-948B-1728B52AA6E4}">
+                <adec:decorative xmlns:adec="http://schemas.microsoft.com/office/drawing/2017/decorative" val="1"/>
+              </a:ext>
+            </a:extLst>
+          </p:cNvPr>
+          <p:cNvSpPr>
+            <a:spLocks noGrp="1" noRot="1" noChangeAspect="1" noMove="1" noResize="1" noEditPoints="1" noAdjustHandles="1" noChangeArrowheads="1" noChangeShapeType="1" noTextEdit="1"/>
+          </p:cNvSpPr>
+          <p:nvPr>
+            <p:extLst>
+              <p:ext uri="{386F3935-93C4-4BCD-93E2-E3B085C9AB24}">
+                <p16:designElem xmlns:p16="http://schemas.microsoft.com/office/powerpoint/2015/main" val="1"/>
+              </p:ext>
+            </p:extLst>
+          </p:nvPr>
+        </p:nvSpPr>
+        <p:spPr>
+          <a:xfrm>
+            <a:off x="0" y="0"/>
+            <a:ext cx="4654296" cy="6858000"/>
+          </a:xfrm>
+          <a:prstGeom prst="rect">
+            <a:avLst/>
+          </a:prstGeom>
+          <a:gradFill>
+            <a:gsLst>
+              <a:gs pos="0">
+                <a:srgbClr val="FFFFFF"/>
+              </a:gs>
+              <a:gs pos="30000">
+                <a:srgbClr val="FFFFFF"/>
+              </a:gs>
+              <a:gs pos="61000">
+                <a:srgbClr val="F8F8F8"/>
+              </a:gs>
+              <a:gs pos="97000">
+                <a:srgbClr val="E5E5E5"/>
+              </a:gs>
+            </a:gsLst>
+            <a:path path="circle">
+              <a:fillToRect l="50000" t="50000" r="50000" b="50000"/>
+            </a:path>
+          </a:gradFill>
+          <a:ln>
+            <a:noFill/>
+          </a:ln>
+          <a:effectLst>
+            <a:innerShdw blurRad="63500" dist="12700">
+              <a:prstClr val="black">
+                <a:alpha val="35000"/>
+              </a:prstClr>
+            </a:innerShdw>
+          </a:effectLst>
+        </p:spPr>
+        <p:style>
+          <a:lnRef idx="2">
+            <a:schemeClr val="accent1">
+              <a:shade val="50000"/>
+            </a:schemeClr>
+          </a:lnRef>
+          <a:fillRef idx="1">
+            <a:schemeClr val="accent1"/>
+          </a:fillRef>
+          <a:effectRef idx="0">
+            <a:schemeClr val="accent1"/>
+          </a:effectRef>
+          <a:fontRef idx="minor">
+            <a:schemeClr val="lt1"/>
+          </a:fontRef>
+        </p:style>
+        <p:txBody>
+          <a:bodyPr rtlCol="0" anchor="ctr"/>
+          <a:lstStyle/>
+          <a:p>
+            <a:pPr algn="ctr"/>
+            <a:endParaRPr lang="en-US" dirty="0"/>
+          </a:p>
+        </p:txBody>
+      </p:sp>
+      <p:sp>
+        <p:nvSpPr>
+          <p:cNvPr id="2" name="Title 1">
+            <a:extLst>
+              <a:ext uri="{FF2B5EF4-FFF2-40B4-BE49-F238E27FC236}">
+                <a16:creationId xmlns:a16="http://schemas.microsoft.com/office/drawing/2014/main" id="{F6F200E9-8116-4990-B241-6223D73CDEC5}"/>
+              </a:ext>
+            </a:extLst>
+          </p:cNvPr>
+          <p:cNvSpPr>
+            <a:spLocks noGrp="1"/>
+          </p:cNvSpPr>
+          <p:nvPr>
+            <p:ph type="title"/>
+          </p:nvPr>
+        </p:nvSpPr>
+        <p:spPr>
+          <a:xfrm>
+            <a:off x="0" y="-1"/>
+            <a:ext cx="4654296" cy="6857999"/>
+          </a:xfrm>
+          <a:gradFill flip="none" rotWithShape="1">
+            <a:gsLst>
+              <a:gs pos="0">
+                <a:schemeClr val="accent6">
+                  <a:shade val="30000"/>
+                  <a:satMod val="115000"/>
+                </a:schemeClr>
+              </a:gs>
+              <a:gs pos="50000">
+                <a:schemeClr val="accent6">
+                  <a:shade val="67500"/>
+                  <a:satMod val="115000"/>
+                </a:schemeClr>
+              </a:gs>
+              <a:gs pos="100000">
+                <a:schemeClr val="accent6">
+                  <a:shade val="100000"/>
+                  <a:satMod val="115000"/>
+                </a:schemeClr>
+              </a:gs>
+            </a:gsLst>
+            <a:lin ang="2700000" scaled="1"/>
+            <a:tileRect/>
+          </a:gradFill>
+          <a:ln>
+            <a:noFill/>
+          </a:ln>
+        </p:spPr>
+        <p:txBody>
+          <a:bodyPr>
+            <a:normAutofit/>
+          </a:bodyPr>
+          <a:lstStyle/>
+          <a:p>
+            <a:r>
+              <a:rPr lang="en-US" dirty="0">
+                <a:solidFill>
+                  <a:schemeClr val="tx1"/>
+                </a:solidFill>
+              </a:rPr>
+              <a:t>EJS</a:t>
+            </a:r>
+          </a:p>
+        </p:txBody>
+      </p:sp>
+      <p:sp useBgFill="1">
+        <p:nvSpPr>
+          <p:cNvPr id="12" name="Rectangle 11">
+            <a:extLst>
+              <a:ext uri="{FF2B5EF4-FFF2-40B4-BE49-F238E27FC236}">
+                <a16:creationId xmlns:a16="http://schemas.microsoft.com/office/drawing/2014/main" id="{8D21268E-FF5E-4624-BB9D-B825216E94B3}"/>
+              </a:ext>
+              <a:ext uri="{C183D7F6-B498-43B3-948B-1728B52AA6E4}">
+                <adec:decorative xmlns:adec="http://schemas.microsoft.com/office/drawing/2017/decorative" val="1"/>
+              </a:ext>
+            </a:extLst>
+          </p:cNvPr>
+          <p:cNvSpPr>
+            <a:spLocks noGrp="1" noRot="1" noChangeAspect="1" noMove="1" noResize="1" noEditPoints="1" noAdjustHandles="1" noChangeArrowheads="1" noChangeShapeType="1" noTextEdit="1"/>
+          </p:cNvSpPr>
+          <p:nvPr>
+            <p:extLst>
+              <p:ext uri="{386F3935-93C4-4BCD-93E2-E3B085C9AB24}">
+                <p16:designElem xmlns:p16="http://schemas.microsoft.com/office/powerpoint/2015/main" val="1"/>
+              </p:ext>
+            </p:extLst>
+          </p:nvPr>
+        </p:nvSpPr>
+        <p:spPr>
+          <a:xfrm>
+            <a:off x="5134082" y="469900"/>
+            <a:ext cx="6582982" cy="5918200"/>
+          </a:xfrm>
+          <a:prstGeom prst="rect">
+            <a:avLst/>
+          </a:prstGeom>
+          <a:ln>
+            <a:noFill/>
+          </a:ln>
+          <a:effectLst>
+            <a:outerShdw blurRad="50800" dist="38100" dir="5400000" algn="t" rotWithShape="0">
+              <a:prstClr val="black">
+                <a:alpha val="40000"/>
+              </a:prstClr>
+            </a:outerShdw>
+          </a:effectLst>
+          <a:scene3d>
+            <a:camera prst="orthographicFront"/>
+            <a:lightRig rig="balanced" dir="t"/>
+          </a:scene3d>
+          <a:sp3d>
+            <a:bevelT w="6350" h="6350"/>
+          </a:sp3d>
+        </p:spPr>
+        <p:style>
+          <a:lnRef idx="2">
+            <a:schemeClr val="accent1">
+              <a:shade val="50000"/>
+            </a:schemeClr>
+          </a:lnRef>
+          <a:fillRef idx="1">
+            <a:schemeClr val="accent1"/>
+          </a:fillRef>
+          <a:effectRef idx="0">
+            <a:schemeClr val="accent1"/>
+          </a:effectRef>
+          <a:fontRef idx="minor">
+            <a:schemeClr val="lt1"/>
+          </a:fontRef>
+        </p:style>
+        <p:txBody>
+          <a:bodyPr rtlCol="0" anchor="ctr"/>
+          <a:lstStyle/>
+          <a:p>
+            <a:pPr algn="ctr"/>
+            <a:endParaRPr lang="en-US" dirty="0"/>
+          </a:p>
+        </p:txBody>
+      </p:sp>
+      <p:sp>
+        <p:nvSpPr>
+          <p:cNvPr id="14" name="Rectangle 13">
+            <a:extLst>
+              <a:ext uri="{FF2B5EF4-FFF2-40B4-BE49-F238E27FC236}">
+                <a16:creationId xmlns:a16="http://schemas.microsoft.com/office/drawing/2014/main" id="{92819B5D-60BA-4995-92D8-FC547E60484F}"/>
+              </a:ext>
+              <a:ext uri="{C183D7F6-B498-43B3-948B-1728B52AA6E4}">
+                <adec:decorative xmlns:adec="http://schemas.microsoft.com/office/drawing/2017/decorative" val="1"/>
+              </a:ext>
+            </a:extLst>
+          </p:cNvPr>
+          <p:cNvSpPr>
+            <a:spLocks noGrp="1" noRot="1" noChangeAspect="1" noMove="1" noResize="1" noEditPoints="1" noAdjustHandles="1" noChangeArrowheads="1" noChangeShapeType="1" noTextEdit="1"/>
+          </p:cNvSpPr>
+          <p:nvPr>
+            <p:extLst>
+              <p:ext uri="{386F3935-93C4-4BCD-93E2-E3B085C9AB24}">
+                <p16:designElem xmlns:p16="http://schemas.microsoft.com/office/powerpoint/2015/main" val="1"/>
+              </p:ext>
+            </p:extLst>
+          </p:nvPr>
+        </p:nvSpPr>
+        <p:spPr>
+          <a:xfrm>
+            <a:off x="5298325" y="635508"/>
+            <a:ext cx="6254496" cy="5586984"/>
+          </a:xfrm>
+          <a:prstGeom prst="rect">
+            <a:avLst/>
+          </a:prstGeom>
+          <a:noFill/>
+          <a:ln w="15875" cap="flat">
+            <a:solidFill>
+              <a:schemeClr val="accent1"/>
+            </a:solidFill>
+            <a:miter lim="800000"/>
+          </a:ln>
+          <a:effectLst/>
+        </p:spPr>
+        <p:style>
+          <a:lnRef idx="1">
+            <a:schemeClr val="accent1"/>
+          </a:lnRef>
+          <a:fillRef idx="3">
+            <a:schemeClr val="accent1"/>
+          </a:fillRef>
+          <a:effectRef idx="2">
+            <a:schemeClr val="accent1"/>
+          </a:effectRef>
+          <a:fontRef idx="minor">
+            <a:schemeClr val="lt1"/>
+          </a:fontRef>
+        </p:style>
+      </p:sp>
+      <p:sp>
+        <p:nvSpPr>
+          <p:cNvPr id="4" name="Content Placeholder 3">
+            <a:extLst>
+              <a:ext uri="{FF2B5EF4-FFF2-40B4-BE49-F238E27FC236}">
+                <a16:creationId xmlns:a16="http://schemas.microsoft.com/office/drawing/2014/main" id="{6ECE92EC-2273-0262-8E3D-0B1A0F8981CC}"/>
+              </a:ext>
+            </a:extLst>
+          </p:cNvPr>
+          <p:cNvSpPr>
+            <a:spLocks noGrp="1"/>
+          </p:cNvSpPr>
+          <p:nvPr>
+            <p:ph idx="1"/>
+          </p:nvPr>
+        </p:nvSpPr>
+        <p:spPr>
+          <a:xfrm>
+            <a:off x="5410201" y="699611"/>
+            <a:ext cx="5998028" cy="5418160"/>
+          </a:xfrm>
+        </p:spPr>
+        <p:txBody>
+          <a:bodyPr>
+            <a:normAutofit/>
+          </a:bodyPr>
+          <a:lstStyle/>
+          <a:p>
+            <a:r>
+              <a:rPr lang="en-US" sz="2800" dirty="0"/>
+              <a:t>Embedded </a:t>
+            </a:r>
+            <a:r>
+              <a:rPr lang="en-US" sz="2800" dirty="0" err="1"/>
+              <a:t>Javascript</a:t>
+            </a:r>
+            <a:r>
+              <a:rPr lang="en-US" sz="2800" dirty="0"/>
+              <a:t> Templating is a templating engine used by Node.js. Template engine helps to create an HTML template with minimal code</a:t>
+            </a:r>
+            <a:r>
+              <a:rPr lang="en-US" sz="3600" dirty="0"/>
+              <a:t>.</a:t>
+            </a:r>
+          </a:p>
+          <a:p>
+            <a:r>
+              <a:rPr kumimoji="0" lang="en-US" altLang="en-US" sz="3600" b="0" i="0" u="none" strike="noStrike" cap="none" normalizeH="0" baseline="0" dirty="0" err="1">
+                <a:ln>
+                  <a:noFill/>
+                </a:ln>
+                <a:solidFill>
+                  <a:schemeClr val="tx1"/>
+                </a:solidFill>
+                <a:effectLst/>
+              </a:rPr>
+              <a:t>npm</a:t>
+            </a:r>
+            <a:r>
+              <a:rPr kumimoji="0" lang="en-US" altLang="en-US" sz="3600" b="0" i="0" u="none" strike="noStrike" cap="none" normalizeH="0" baseline="0" dirty="0">
+                <a:ln>
+                  <a:noFill/>
+                </a:ln>
+                <a:solidFill>
+                  <a:schemeClr val="tx1"/>
+                </a:solidFill>
+                <a:effectLst/>
+              </a:rPr>
+              <a:t> install </a:t>
+            </a:r>
+            <a:r>
+              <a:rPr kumimoji="0" lang="en-US" altLang="en-US" sz="3600" b="0" i="0" u="none" strike="noStrike" cap="none" normalizeH="0" baseline="0" dirty="0" err="1">
+                <a:ln>
+                  <a:noFill/>
+                </a:ln>
+                <a:solidFill>
+                  <a:schemeClr val="tx1"/>
+                </a:solidFill>
+                <a:effectLst/>
+              </a:rPr>
+              <a:t>ejs</a:t>
+            </a:r>
+            <a:r>
+              <a:rPr kumimoji="0" lang="en-US" altLang="en-US" sz="3600" b="0" i="0" u="none" strike="noStrike" cap="none" normalizeH="0" baseline="0" dirty="0">
+                <a:ln>
+                  <a:noFill/>
+                </a:ln>
+                <a:solidFill>
+                  <a:schemeClr val="tx1"/>
+                </a:solidFill>
+                <a:effectLst/>
+              </a:rPr>
+              <a:t> --save</a:t>
+            </a:r>
+            <a:r>
+              <a:rPr kumimoji="0" lang="en-US" altLang="en-US" sz="2800" b="0" i="0" u="none" strike="noStrike" cap="none" normalizeH="0" baseline="0" dirty="0">
+                <a:ln>
+                  <a:noFill/>
+                </a:ln>
+                <a:solidFill>
+                  <a:schemeClr val="tx1"/>
+                </a:solidFill>
+                <a:effectLst/>
+              </a:rPr>
+              <a:t> </a:t>
+            </a:r>
+            <a:endParaRPr kumimoji="0" lang="en-US" altLang="en-US" sz="6600" b="0" i="0" u="none" strike="noStrike" cap="none" normalizeH="0" baseline="0" dirty="0">
+              <a:ln>
+                <a:noFill/>
+              </a:ln>
+              <a:solidFill>
+                <a:schemeClr val="tx1"/>
+              </a:solidFill>
+              <a:effectLst/>
+            </a:endParaRPr>
+          </a:p>
+          <a:p>
+            <a:endParaRPr lang="en-US" sz="3600" dirty="0"/>
+          </a:p>
+          <a:p>
+            <a:endParaRPr lang="en-IN" sz="3600" dirty="0"/>
+          </a:p>
+        </p:txBody>
+      </p:sp>
+    </p:spTree>
+    <p:extLst>
+      <p:ext uri="{BB962C8B-B14F-4D97-AF65-F5344CB8AC3E}">
+        <p14:creationId xmlns:p14="http://schemas.microsoft.com/office/powerpoint/2010/main" val="1615059694"/>
+      </p:ext>
+    </p:extLst>
+  </p:cSld>
+  <p:clrMapOvr>
+    <a:overrideClrMapping bg1="dk1" tx1="lt1" bg2="dk2" tx2="lt2" accent1="accent1" accent2="accent2" accent3="accent3" accent4="accent4" accent5="accent5" accent6="accent6" hlink="hlink" folHlink="folHlink"/>
+  </p:clrMapOvr>
+</p:sld>
+</file>
+
+<file path=ppt/slides/slide6.xml><?xml version="1.0" encoding="utf-8"?>
 <p:sld xmlns:a="http://schemas.openxmlformats.org/drawingml/2006/main" xmlns:r="http://schemas.openxmlformats.org/officeDocument/2006/relationships" xmlns:p="http://schemas.openxmlformats.org/presentationml/2006/main">
   <p:cSld>
     <p:bg>
@@ -25120,7 +25873,7 @@
     </p:spTree>
     <p:extLst>
       <p:ext uri="{BB962C8B-B14F-4D97-AF65-F5344CB8AC3E}">
-        <p14:creationId xmlns:p14="http://schemas.microsoft.com/office/powerpoint/2010/main" val="1615059694"/>
+        <p14:creationId xmlns:p14="http://schemas.microsoft.com/office/powerpoint/2010/main" val="2820776773"/>
       </p:ext>
     </p:extLst>
   </p:cSld>
@@ -25130,7 +25883,7 @@
 </p:sld>
 </file>
 
-<file path=ppt/slides/slide6.xml><?xml version="1.0" encoding="utf-8"?>
+<file path=ppt/slides/slide7.xml><?xml version="1.0" encoding="utf-8"?>
 <p:sld xmlns:a="http://schemas.openxmlformats.org/drawingml/2006/main" xmlns:r="http://schemas.openxmlformats.org/officeDocument/2006/relationships" xmlns:p="http://schemas.openxmlformats.org/presentationml/2006/main">
   <p:cSld>
     <p:spTree>
@@ -25271,7 +26024,7 @@
 </p:sld>
 </file>
 
-<file path=ppt/slides/slide7.xml><?xml version="1.0" encoding="utf-8"?>
+<file path=ppt/slides/slide8.xml><?xml version="1.0" encoding="utf-8"?>
 <p:sld xmlns:a="http://schemas.openxmlformats.org/drawingml/2006/main" xmlns:r="http://schemas.openxmlformats.org/officeDocument/2006/relationships" xmlns:p="http://schemas.openxmlformats.org/presentationml/2006/main">
   <p:cSld>
     <p:spTree>
@@ -25426,7 +26179,7 @@
 </p:sld>
 </file>
 
-<file path=ppt/slides/slide8.xml><?xml version="1.0" encoding="utf-8"?>
+<file path=ppt/slides/slide9.xml><?xml version="1.0" encoding="utf-8"?>
 <p:sld xmlns:a="http://schemas.openxmlformats.org/drawingml/2006/main" xmlns:r="http://schemas.openxmlformats.org/officeDocument/2006/relationships" xmlns:p="http://schemas.openxmlformats.org/presentationml/2006/main">
   <p:cSld>
     <p:spTree>
@@ -25549,168 +26302,6 @@
     <p:extLst>
       <p:ext uri="{BB962C8B-B14F-4D97-AF65-F5344CB8AC3E}">
         <p14:creationId xmlns:p14="http://schemas.microsoft.com/office/powerpoint/2010/main" val="4078018954"/>
-      </p:ext>
-    </p:extLst>
-  </p:cSld>
-  <p:clrMapOvr>
-    <a:masterClrMapping/>
-  </p:clrMapOvr>
-</p:sld>
-</file>
-
-<file path=ppt/slides/slide9.xml><?xml version="1.0" encoding="utf-8"?>
-<p:sld xmlns:a="http://schemas.openxmlformats.org/drawingml/2006/main" xmlns:r="http://schemas.openxmlformats.org/officeDocument/2006/relationships" xmlns:p="http://schemas.openxmlformats.org/presentationml/2006/main">
-  <p:cSld>
-    <p:spTree>
-      <p:nvGrpSpPr>
-        <p:cNvPr id="1" name=""/>
-        <p:cNvGrpSpPr/>
-        <p:nvPr/>
-      </p:nvGrpSpPr>
-      <p:grpSpPr>
-        <a:xfrm>
-          <a:off x="0" y="0"/>
-          <a:ext cx="0" cy="0"/>
-          <a:chOff x="0" y="0"/>
-          <a:chExt cx="0" cy="0"/>
-        </a:xfrm>
-      </p:grpSpPr>
-      <p:sp>
-        <p:nvSpPr>
-          <p:cNvPr id="2" name="Title 1">
-            <a:extLst>
-              <a:ext uri="{FF2B5EF4-FFF2-40B4-BE49-F238E27FC236}">
-                <a16:creationId xmlns:a16="http://schemas.microsoft.com/office/drawing/2014/main" id="{F6F200E9-8116-4990-B241-6223D73CDEC5}"/>
-              </a:ext>
-            </a:extLst>
-          </p:cNvPr>
-          <p:cNvSpPr>
-            <a:spLocks noGrp="1"/>
-          </p:cNvSpPr>
-          <p:nvPr>
-            <p:ph type="title"/>
-          </p:nvPr>
-        </p:nvSpPr>
-        <p:spPr>
-          <a:xfrm>
-            <a:off x="0" y="-1"/>
-            <a:ext cx="4654296" cy="6857999"/>
-          </a:xfrm>
-          <a:gradFill flip="none" rotWithShape="1">
-            <a:gsLst>
-              <a:gs pos="0">
-                <a:schemeClr val="accent6">
-                  <a:shade val="30000"/>
-                  <a:satMod val="115000"/>
-                </a:schemeClr>
-              </a:gs>
-              <a:gs pos="50000">
-                <a:schemeClr val="accent6">
-                  <a:shade val="67500"/>
-                  <a:satMod val="115000"/>
-                </a:schemeClr>
-              </a:gs>
-              <a:gs pos="100000">
-                <a:schemeClr val="accent6">
-                  <a:shade val="100000"/>
-                  <a:satMod val="115000"/>
-                </a:schemeClr>
-              </a:gs>
-            </a:gsLst>
-            <a:lin ang="2700000" scaled="1"/>
-            <a:tileRect/>
-          </a:gradFill>
-          <a:ln>
-            <a:noFill/>
-          </a:ln>
-        </p:spPr>
-        <p:txBody>
-          <a:bodyPr>
-            <a:normAutofit/>
-          </a:bodyPr>
-          <a:lstStyle/>
-          <a:p>
-            <a:r>
-              <a:rPr lang="en-US" sz="13800" b="0" dirty="0">
-                <a:solidFill>
-                  <a:schemeClr val="bg1"/>
-                </a:solidFill>
-                <a:effectLst/>
-                <a:latin typeface="Consolas" panose="020B0609020204030204" pitchFamily="49" charset="0"/>
-              </a:rPr>
-              <a:t>path</a:t>
-            </a:r>
-            <a:endParaRPr lang="en-US" dirty="0">
-              <a:solidFill>
-                <a:schemeClr val="bg1"/>
-              </a:solidFill>
-            </a:endParaRPr>
-          </a:p>
-        </p:txBody>
-      </p:sp>
-      <p:pic>
-        <p:nvPicPr>
-          <p:cNvPr id="9" name="Content Placeholder 8">
-            <a:extLst>
-              <a:ext uri="{FF2B5EF4-FFF2-40B4-BE49-F238E27FC236}">
-                <a16:creationId xmlns:a16="http://schemas.microsoft.com/office/drawing/2014/main" id="{0BAC166F-4FA7-5BCB-A123-60C1467F7D16}"/>
-              </a:ext>
-            </a:extLst>
-          </p:cNvPr>
-          <p:cNvPicPr>
-            <a:picLocks noGrp="1" noChangeAspect="1"/>
-          </p:cNvPicPr>
-          <p:nvPr>
-            <p:ph idx="1"/>
-          </p:nvPr>
-        </p:nvPicPr>
-        <p:blipFill>
-          <a:blip r:embed="rId3"/>
-          <a:stretch>
-            <a:fillRect/>
-          </a:stretch>
-        </p:blipFill>
-        <p:spPr>
-          <a:xfrm>
-            <a:off x="4796183" y="703019"/>
-            <a:ext cx="6468490" cy="1561209"/>
-          </a:xfrm>
-        </p:spPr>
-      </p:pic>
-      <p:pic>
-        <p:nvPicPr>
-          <p:cNvPr id="4" name="Picture 3">
-            <a:extLst>
-              <a:ext uri="{FF2B5EF4-FFF2-40B4-BE49-F238E27FC236}">
-                <a16:creationId xmlns:a16="http://schemas.microsoft.com/office/drawing/2014/main" id="{CBD3BE9D-F04B-9937-B84B-485137B7EC54}"/>
-              </a:ext>
-            </a:extLst>
-          </p:cNvPr>
-          <p:cNvPicPr>
-            <a:picLocks noChangeAspect="1"/>
-          </p:cNvPicPr>
-          <p:nvPr/>
-        </p:nvPicPr>
-        <p:blipFill>
-          <a:blip r:embed="rId4"/>
-          <a:stretch>
-            <a:fillRect/>
-          </a:stretch>
-        </p:blipFill>
-        <p:spPr>
-          <a:xfrm>
-            <a:off x="4811433" y="2730463"/>
-            <a:ext cx="4408572" cy="2886565"/>
-          </a:xfrm>
-          <a:prstGeom prst="rect">
-            <a:avLst/>
-          </a:prstGeom>
-        </p:spPr>
-      </p:pic>
-    </p:spTree>
-    <p:extLst>
-      <p:ext uri="{BB962C8B-B14F-4D97-AF65-F5344CB8AC3E}">
-        <p14:creationId xmlns:p14="http://schemas.microsoft.com/office/powerpoint/2010/main" val="2713327902"/>
       </p:ext>
     </p:extLst>
   </p:cSld>
@@ -26544,6 +27135,15 @@
 </file>
 
 <file path=customXml/item1.xml><?xml version="1.0" encoding="utf-8"?>
+<p:properties xmlns:p="http://schemas.microsoft.com/office/2006/metadata/properties" xmlns:xsi="http://www.w3.org/2001/XMLSchema-instance" xmlns:pc="http://schemas.microsoft.com/office/infopath/2007/PartnerControls">
+  <documentManagement>
+    <Status xmlns="71af3243-3dd4-4a8d-8c0d-dd76da1f02a5">Not started</Status>
+    <MediaServiceKeyPoints xmlns="71af3243-3dd4-4a8d-8c0d-dd76da1f02a5" xsi:nil="true"/>
+  </documentManagement>
+</p:properties>
+</file>
+
+<file path=customXml/item2.xml><?xml version="1.0" encoding="utf-8"?>
 <ct:contentTypeSchema xmlns:ct="http://schemas.microsoft.com/office/2006/metadata/contentType" xmlns:ma="http://schemas.microsoft.com/office/2006/metadata/properties/metaAttributes" ct:_="" ma:_="" ma:contentTypeName="Document" ma:contentTypeID="0x01010079F111ED35F8CC479449609E8A0923A6" ma:contentTypeVersion="12" ma:contentTypeDescription="Create a new document." ma:contentTypeScope="" ma:versionID="93813dd7ca6ad654711aa0ab317e03a3">
   <xsd:schema xmlns:xsd="http://www.w3.org/2001/XMLSchema" xmlns:xs="http://www.w3.org/2001/XMLSchema" xmlns:p="http://schemas.microsoft.com/office/2006/metadata/properties" xmlns:ns2="71af3243-3dd4-4a8d-8c0d-dd76da1f02a5" xmlns:ns3="16c05727-aa75-4e4a-9b5f-8a80a1165891" targetNamespace="http://schemas.microsoft.com/office/2006/metadata/properties" ma:root="true" ma:fieldsID="f11dc0ce689dd3925e84e4e35398c6e7" ns2:_="" ns3:_="">
     <xsd:import namespace="71af3243-3dd4-4a8d-8c0d-dd76da1f02a5"/>
@@ -26764,15 +27364,6 @@
 </ct:contentTypeSchema>
 </file>
 
-<file path=customXml/item2.xml><?xml version="1.0" encoding="utf-8"?>
-<p:properties xmlns:p="http://schemas.microsoft.com/office/2006/metadata/properties" xmlns:xsi="http://www.w3.org/2001/XMLSchema-instance" xmlns:pc="http://schemas.microsoft.com/office/infopath/2007/PartnerControls">
-  <documentManagement>
-    <Status xmlns="71af3243-3dd4-4a8d-8c0d-dd76da1f02a5">Not started</Status>
-    <MediaServiceKeyPoints xmlns="71af3243-3dd4-4a8d-8c0d-dd76da1f02a5" xsi:nil="true"/>
-  </documentManagement>
-</p:properties>
-</file>
-
 <file path=customXml/item3.xml><?xml version="1.0" encoding="utf-8"?>
 <?mso-contentType ?>
 <FormTemplates xmlns="http://schemas.microsoft.com/sharepoint/v3/contenttype/forms">
@@ -26783,6 +27374,16 @@
 </file>
 
 <file path=customXml/itemProps1.xml><?xml version="1.0" encoding="utf-8"?>
+<ds:datastoreItem xmlns:ds="http://schemas.openxmlformats.org/officeDocument/2006/customXml" ds:itemID="{E0C6F0FA-5858-4AD1-8F89-D32310719A51}">
+  <ds:schemaRefs>
+    <ds:schemaRef ds:uri="http://schemas.microsoft.com/office/2006/metadata/properties"/>
+    <ds:schemaRef ds:uri="http://schemas.microsoft.com/office/infopath/2007/PartnerControls"/>
+    <ds:schemaRef ds:uri="71af3243-3dd4-4a8d-8c0d-dd76da1f02a5"/>
+  </ds:schemaRefs>
+</ds:datastoreItem>
+</file>
+
+<file path=customXml/itemProps2.xml><?xml version="1.0" encoding="utf-8"?>
 <ds:datastoreItem xmlns:ds="http://schemas.openxmlformats.org/officeDocument/2006/customXml" ds:itemID="{0F92F16A-38EE-4C9D-AFD3-2845EC2D9067}">
   <ds:schemaRefs>
     <ds:schemaRef ds:uri="http://schemas.microsoft.com/office/2006/metadata/contentType"/>
@@ -26801,16 +27402,6 @@
 </ds:datastoreItem>
 </file>
 
-<file path=customXml/itemProps2.xml><?xml version="1.0" encoding="utf-8"?>
-<ds:datastoreItem xmlns:ds="http://schemas.openxmlformats.org/officeDocument/2006/customXml" ds:itemID="{E0C6F0FA-5858-4AD1-8F89-D32310719A51}">
-  <ds:schemaRefs>
-    <ds:schemaRef ds:uri="http://schemas.microsoft.com/office/2006/metadata/properties"/>
-    <ds:schemaRef ds:uri="http://schemas.microsoft.com/office/infopath/2007/PartnerControls"/>
-    <ds:schemaRef ds:uri="71af3243-3dd4-4a8d-8c0d-dd76da1f02a5"/>
-  </ds:schemaRefs>
-</ds:datastoreItem>
-</file>
-
 <file path=customXml/itemProps3.xml><?xml version="1.0" encoding="utf-8"?>
 <ds:datastoreItem xmlns:ds="http://schemas.openxmlformats.org/officeDocument/2006/customXml" ds:itemID="{075A39CB-C45B-4F08-829C-AB9550EE08FE}">
   <ds:schemaRefs>

</xml_diff>

<commit_message>
ew pdf file added
</commit_message>
<xml_diff>
--- a/WE TRAVEL.pptx
+++ b/WE TRAVEL.pptx
@@ -13993,7 +13993,7 @@
           <a:p>
             <a:fld id="{88B24071-69B2-40A7-B3EA-674584CE017F}" type="datetimeFigureOut">
               <a:rPr lang="en-US" smtClean="0"/>
-              <a:t>10/20/2022</a:t>
+              <a:t>11/17/2022</a:t>
             </a:fld>
             <a:endParaRPr lang="en-US" dirty="0"/>
           </a:p>
@@ -14170,7 +14170,7 @@
           <a:p>
             <a:fld id="{1D16B909-20DD-493C-AC6E-6A09AF3AE40E}" type="datetimeFigureOut">
               <a:rPr lang="en-US" smtClean="0"/>
-              <a:t>10/20/2022</a:t>
+              <a:t>11/17/2022</a:t>
             </a:fld>
             <a:endParaRPr lang="en-US" dirty="0"/>
           </a:p>
@@ -15670,7 +15670,7 @@
             <a:fld id="{B61BEF0D-F0BB-DE4B-95CE-6DB70DBA9567}" type="datetimeFigureOut">
               <a:rPr lang="en-US" smtClean="0"/>
               <a:pPr/>
-              <a:t>10/20/2022</a:t>
+              <a:t>11/17/2022</a:t>
             </a:fld>
             <a:endParaRPr lang="en-US" dirty="0"/>
           </a:p>
@@ -15996,7 +15996,7 @@
             <a:fld id="{B61BEF0D-F0BB-DE4B-95CE-6DB70DBA9567}" type="datetimeFigureOut">
               <a:rPr lang="en-US" smtClean="0"/>
               <a:pPr/>
-              <a:t>10/20/2022</a:t>
+              <a:t>11/17/2022</a:t>
             </a:fld>
             <a:endParaRPr lang="en-US" dirty="0"/>
           </a:p>
@@ -16246,7 +16246,7 @@
             <a:fld id="{B61BEF0D-F0BB-DE4B-95CE-6DB70DBA9567}" type="datetimeFigureOut">
               <a:rPr lang="en-US" smtClean="0"/>
               <a:pPr/>
-              <a:t>10/20/2022</a:t>
+              <a:t>11/17/2022</a:t>
             </a:fld>
             <a:endParaRPr lang="en-US" dirty="0"/>
           </a:p>
@@ -16587,7 +16587,7 @@
             <a:fld id="{B61BEF0D-F0BB-DE4B-95CE-6DB70DBA9567}" type="datetimeFigureOut">
               <a:rPr lang="en-US" smtClean="0"/>
               <a:pPr/>
-              <a:t>10/20/2022</a:t>
+              <a:t>11/17/2022</a:t>
             </a:fld>
             <a:endParaRPr lang="en-US" dirty="0"/>
           </a:p>
@@ -16936,7 +16936,7 @@
             <a:fld id="{B61BEF0D-F0BB-DE4B-95CE-6DB70DBA9567}" type="datetimeFigureOut">
               <a:rPr lang="en-US" smtClean="0"/>
               <a:pPr/>
-              <a:t>10/20/2022</a:t>
+              <a:t>11/17/2022</a:t>
             </a:fld>
             <a:endParaRPr lang="en-US" dirty="0"/>
           </a:p>
@@ -17312,7 +17312,7 @@
             <a:fld id="{B61BEF0D-F0BB-DE4B-95CE-6DB70DBA9567}" type="datetimeFigureOut">
               <a:rPr lang="en-US" smtClean="0"/>
               <a:pPr/>
-              <a:t>10/20/2022</a:t>
+              <a:t>11/17/2022</a:t>
             </a:fld>
             <a:endParaRPr lang="en-US" dirty="0"/>
           </a:p>
@@ -17784,7 +17784,7 @@
             <a:fld id="{B61BEF0D-F0BB-DE4B-95CE-6DB70DBA9567}" type="datetimeFigureOut">
               <a:rPr lang="en-US" smtClean="0"/>
               <a:pPr/>
-              <a:t>10/20/2022</a:t>
+              <a:t>11/17/2022</a:t>
             </a:fld>
             <a:endParaRPr lang="en-US" dirty="0"/>
           </a:p>
@@ -17991,7 +17991,7 @@
             <a:fld id="{B61BEF0D-F0BB-DE4B-95CE-6DB70DBA9567}" type="datetimeFigureOut">
               <a:rPr lang="en-US" smtClean="0"/>
               <a:pPr/>
-              <a:t>10/20/2022</a:t>
+              <a:t>11/17/2022</a:t>
             </a:fld>
             <a:endParaRPr lang="en-US" dirty="0"/>
           </a:p>
@@ -18204,7 +18204,7 @@
             <a:fld id="{B61BEF0D-F0BB-DE4B-95CE-6DB70DBA9567}" type="datetimeFigureOut">
               <a:rPr lang="en-US" smtClean="0"/>
               <a:pPr/>
-              <a:t>10/20/2022</a:t>
+              <a:t>11/17/2022</a:t>
             </a:fld>
             <a:endParaRPr lang="en-US" dirty="0"/>
           </a:p>
@@ -18436,7 +18436,7 @@
           <a:p>
             <a:fld id="{05BFA754-D5C3-4E66-96A6-867B257F58DC}" type="datetimeFigureOut">
               <a:rPr lang="en-US" smtClean="0"/>
-              <a:t>10/20/2022</a:t>
+              <a:t>11/17/2022</a:t>
             </a:fld>
             <a:endParaRPr lang="en-US" dirty="0"/>
           </a:p>
@@ -18685,7 +18685,7 @@
             <a:fld id="{B61BEF0D-F0BB-DE4B-95CE-6DB70DBA9567}" type="datetimeFigureOut">
               <a:rPr lang="en-US" smtClean="0"/>
               <a:pPr/>
-              <a:t>10/20/2022</a:t>
+              <a:t>11/17/2022</a:t>
             </a:fld>
             <a:endParaRPr lang="en-US" dirty="0"/>
           </a:p>
@@ -18984,7 +18984,7 @@
           <a:p>
             <a:fld id="{05BFA754-D5C3-4E66-96A6-867B257F58DC}" type="datetimeFigureOut">
               <a:rPr lang="en-US" smtClean="0"/>
-              <a:t>10/20/2022</a:t>
+              <a:t>11/17/2022</a:t>
             </a:fld>
             <a:endParaRPr lang="en-US" dirty="0"/>
           </a:p>
@@ -19367,7 +19367,7 @@
             <a:fld id="{B61BEF0D-F0BB-DE4B-95CE-6DB70DBA9567}" type="datetimeFigureOut">
               <a:rPr lang="en-US" smtClean="0"/>
               <a:pPr/>
-              <a:t>10/20/2022</a:t>
+              <a:t>11/17/2022</a:t>
             </a:fld>
             <a:endParaRPr lang="en-US" dirty="0"/>
           </a:p>
@@ -19518,7 +19518,7 @@
             <a:fld id="{B61BEF0D-F0BB-DE4B-95CE-6DB70DBA9567}" type="datetimeFigureOut">
               <a:rPr lang="en-US" smtClean="0"/>
               <a:pPr/>
-              <a:t>10/20/2022</a:t>
+              <a:t>11/17/2022</a:t>
             </a:fld>
             <a:endParaRPr lang="en-US" dirty="0"/>
           </a:p>
@@ -19646,7 +19646,7 @@
             <a:fld id="{B61BEF0D-F0BB-DE4B-95CE-6DB70DBA9567}" type="datetimeFigureOut">
               <a:rPr lang="en-US" smtClean="0"/>
               <a:pPr/>
-              <a:t>10/20/2022</a:t>
+              <a:t>11/17/2022</a:t>
             </a:fld>
             <a:endParaRPr lang="en-US" dirty="0"/>
           </a:p>
@@ -19903,7 +19903,7 @@
             <a:fld id="{B61BEF0D-F0BB-DE4B-95CE-6DB70DBA9567}" type="datetimeFigureOut">
               <a:rPr lang="en-US" smtClean="0"/>
               <a:pPr/>
-              <a:t>10/20/2022</a:t>
+              <a:t>11/17/2022</a:t>
             </a:fld>
             <a:endParaRPr lang="en-US" dirty="0"/>
           </a:p>
@@ -20220,7 +20220,7 @@
             <a:fld id="{B61BEF0D-F0BB-DE4B-95CE-6DB70DBA9567}" type="datetimeFigureOut">
               <a:rPr lang="en-US" smtClean="0"/>
               <a:pPr/>
-              <a:t>10/20/2022</a:t>
+              <a:t>11/17/2022</a:t>
             </a:fld>
             <a:endParaRPr lang="en-US" dirty="0"/>
           </a:p>
@@ -20466,7 +20466,7 @@
             <a:fld id="{B61BEF0D-F0BB-DE4B-95CE-6DB70DBA9567}" type="datetimeFigureOut">
               <a:rPr lang="en-US" smtClean="0"/>
               <a:pPr/>
-              <a:t>10/20/2022</a:t>
+              <a:t>11/17/2022</a:t>
             </a:fld>
             <a:endParaRPr lang="en-US" dirty="0"/>
           </a:p>
@@ -21913,7 +21913,7 @@
             <a:r>
               <a:rPr lang="en-US" sz="3600" b="1" dirty="0">
                 <a:solidFill>
-                  <a:srgbClr val="FF0000"/>
+                  <a:schemeClr val="tx1"/>
                 </a:solidFill>
                 <a:highlight>
                   <a:srgbClr val="C0C0C0"/>
@@ -21960,32 +21960,19 @@
           <a:lstStyle/>
           <a:p>
             <a:r>
+              <a:rPr lang="en-US" sz="2400" b="1" dirty="0" err="1"/>
+              <a:t>Shivam</a:t>
+            </a:r>
+            <a:r>
               <a:rPr lang="en-US" sz="2400" b="1" dirty="0"/>
-              <a:t>Ayush Amlesh</a:t>
+              <a:t> Kashyap</a:t>
             </a:r>
           </a:p>
           <a:p>
             <a:r>
               <a:rPr lang="en-US" sz="2400" b="1" dirty="0"/>
-              <a:t>KM042B78</a:t>
+              <a:t>KM062B71</a:t>
             </a:r>
-          </a:p>
-          <a:p>
-            <a:r>
-              <a:rPr lang="en-US" sz="2400" b="1" dirty="0"/>
-              <a:t>Faculty: Dr. </a:t>
-            </a:r>
-            <a:r>
-              <a:rPr lang="en-US" sz="2400" b="1" dirty="0" err="1"/>
-              <a:t>Balwinder</a:t>
-            </a:r>
-            <a:r>
-              <a:rPr lang="en-US" sz="2400" b="1" dirty="0"/>
-              <a:t> Kaur Dhaliwal</a:t>
-            </a:r>
-          </a:p>
-          <a:p>
-            <a:endParaRPr lang="en-US" dirty="0"/>
           </a:p>
         </p:txBody>
       </p:sp>
@@ -25187,13 +25174,18 @@
           <a:lstStyle/>
           <a:p>
             <a:r>
-              <a:rPr lang="en-US" dirty="0">
+              <a:rPr lang="en-US" dirty="0" err="1">
                 <a:solidFill>
                   <a:schemeClr val="tx1"/>
                 </a:solidFill>
               </a:rPr>
-              <a:t>EJS</a:t>
+              <a:t>ejs</a:t>
             </a:r>
+            <a:endParaRPr lang="en-US" dirty="0">
+              <a:solidFill>
+                <a:schemeClr val="tx1"/>
+              </a:solidFill>
+            </a:endParaRPr>
           </a:p>
         </p:txBody>
       </p:sp>

</xml_diff>